<commit_message>
changes after initial review
</commit_message>
<xml_diff>
--- a/artifacts/conMan.pptx
+++ b/artifacts/conMan.pptx
@@ -12,25 +12,33 @@
     <p:sldId id="258" r:id="rId6"/>
     <p:sldId id="259" r:id="rId7"/>
     <p:sldId id="260" r:id="rId8"/>
-    <p:sldId id="264" r:id="rId9"/>
-    <p:sldId id="265" r:id="rId10"/>
-    <p:sldId id="266" r:id="rId11"/>
-    <p:sldId id="263" r:id="rId12"/>
-    <p:sldId id="268" r:id="rId13"/>
-    <p:sldId id="267" r:id="rId14"/>
-    <p:sldId id="269" r:id="rId15"/>
-    <p:sldId id="270" r:id="rId16"/>
-    <p:sldId id="274" r:id="rId17"/>
-    <p:sldId id="262" r:id="rId18"/>
-    <p:sldId id="271" r:id="rId19"/>
-    <p:sldId id="273" r:id="rId20"/>
-    <p:sldId id="275" r:id="rId21"/>
-    <p:sldId id="276" r:id="rId22"/>
-    <p:sldId id="272" r:id="rId23"/>
-    <p:sldId id="277" r:id="rId24"/>
-    <p:sldId id="278" r:id="rId25"/>
-    <p:sldId id="279" r:id="rId26"/>
-    <p:sldId id="280" r:id="rId27"/>
+    <p:sldId id="283" r:id="rId9"/>
+    <p:sldId id="264" r:id="rId10"/>
+    <p:sldId id="265" r:id="rId11"/>
+    <p:sldId id="284" r:id="rId12"/>
+    <p:sldId id="266" r:id="rId13"/>
+    <p:sldId id="263" r:id="rId14"/>
+    <p:sldId id="285" r:id="rId15"/>
+    <p:sldId id="268" r:id="rId16"/>
+    <p:sldId id="267" r:id="rId17"/>
+    <p:sldId id="269" r:id="rId18"/>
+    <p:sldId id="270" r:id="rId19"/>
+    <p:sldId id="274" r:id="rId20"/>
+    <p:sldId id="289" r:id="rId21"/>
+    <p:sldId id="262" r:id="rId22"/>
+    <p:sldId id="271" r:id="rId23"/>
+    <p:sldId id="286" r:id="rId24"/>
+    <p:sldId id="273" r:id="rId25"/>
+    <p:sldId id="275" r:id="rId26"/>
+    <p:sldId id="287" r:id="rId27"/>
+    <p:sldId id="276" r:id="rId28"/>
+    <p:sldId id="288" r:id="rId29"/>
+    <p:sldId id="272" r:id="rId30"/>
+    <p:sldId id="277" r:id="rId31"/>
+    <p:sldId id="278" r:id="rId32"/>
+    <p:sldId id="279" r:id="rId33"/>
+    <p:sldId id="280" r:id="rId34"/>
+    <p:sldId id="282" r:id="rId35"/>
   </p:sldIdLst>
   <p:sldSz cx="12192000" cy="6858000"/>
   <p:notesSz cx="6858000" cy="9144000"/>
@@ -3494,6 +3502,229 @@
           <p:cNvPr id="2" name="Title 1">
             <a:extLst>
               <a:ext uri="{FF2B5EF4-FFF2-40B4-BE49-F238E27FC236}">
+                <a16:creationId xmlns:a16="http://schemas.microsoft.com/office/drawing/2014/main" id="{8BED8509-9152-4B41-ACE2-548263BA84A6}"/>
+              </a:ext>
+            </a:extLst>
+          </p:cNvPr>
+          <p:cNvSpPr>
+            <a:spLocks noGrp="1"/>
+          </p:cNvSpPr>
+          <p:nvPr>
+            <p:ph type="title"/>
+          </p:nvPr>
+        </p:nvSpPr>
+        <p:spPr/>
+        <p:txBody>
+          <a:bodyPr/>
+          <a:lstStyle/>
+          <a:p>
+            <a:r>
+              <a:rPr lang="en-US" dirty="0"/>
+              <a:t>1b Create / Edit IG entry</a:t>
+            </a:r>
+          </a:p>
+        </p:txBody>
+      </p:sp>
+      <p:sp>
+        <p:nvSpPr>
+          <p:cNvPr id="3" name="Content Placeholder 2">
+            <a:extLst>
+              <a:ext uri="{FF2B5EF4-FFF2-40B4-BE49-F238E27FC236}">
+                <a16:creationId xmlns:a16="http://schemas.microsoft.com/office/drawing/2014/main" id="{3F95FCB2-34A4-064B-94BE-72A5C07C03B3}"/>
+              </a:ext>
+            </a:extLst>
+          </p:cNvPr>
+          <p:cNvSpPr>
+            <a:spLocks noGrp="1"/>
+          </p:cNvSpPr>
+          <p:nvPr>
+            <p:ph idx="1"/>
+          </p:nvPr>
+        </p:nvSpPr>
+        <p:spPr>
+          <a:xfrm>
+            <a:off x="6759146" y="1690688"/>
+            <a:ext cx="4436075" cy="4351338"/>
+          </a:xfrm>
+        </p:spPr>
+        <p:txBody>
+          <a:bodyPr/>
+          <a:lstStyle/>
+          <a:p>
+            <a:r>
+              <a:rPr lang="en-US" dirty="0"/>
+              <a:t>Keep name &amp; description short</a:t>
+            </a:r>
+          </a:p>
+          <a:p>
+            <a:r>
+              <a:rPr lang="en-US" dirty="0"/>
+              <a:t>Use ‘External Link’ for location of IG</a:t>
+            </a:r>
+          </a:p>
+          <a:p>
+            <a:r>
+              <a:rPr lang="en-US" dirty="0"/>
+              <a:t>Set package and version so can be found in registry</a:t>
+            </a:r>
+          </a:p>
+          <a:p>
+            <a:pPr lvl="1"/>
+            <a:r>
+              <a:rPr lang="en-US" dirty="0"/>
+              <a:t>Link to registry bottom right for convenience</a:t>
+            </a:r>
+          </a:p>
+        </p:txBody>
+      </p:sp>
+      <p:pic>
+        <p:nvPicPr>
+          <p:cNvPr id="5" name="Picture 4">
+            <a:extLst>
+              <a:ext uri="{FF2B5EF4-FFF2-40B4-BE49-F238E27FC236}">
+                <a16:creationId xmlns:a16="http://schemas.microsoft.com/office/drawing/2014/main" id="{D8819251-3602-E54B-ADA7-7594D62CB7FD}"/>
+              </a:ext>
+            </a:extLst>
+          </p:cNvPr>
+          <p:cNvPicPr>
+            <a:picLocks noChangeAspect="1"/>
+          </p:cNvPicPr>
+          <p:nvPr/>
+        </p:nvPicPr>
+        <p:blipFill>
+          <a:blip r:embed="rId2"/>
+          <a:stretch>
+            <a:fillRect/>
+          </a:stretch>
+        </p:blipFill>
+        <p:spPr>
+          <a:xfrm>
+            <a:off x="838200" y="1406483"/>
+            <a:ext cx="5709737" cy="5167312"/>
+          </a:xfrm>
+          <a:prstGeom prst="rect">
+            <a:avLst/>
+          </a:prstGeom>
+        </p:spPr>
+      </p:pic>
+    </p:spTree>
+    <p:extLst>
+      <p:ext uri="{BB962C8B-B14F-4D97-AF65-F5344CB8AC3E}">
+        <p14:creationId xmlns:p14="http://schemas.microsoft.com/office/powerpoint/2010/main" val="4132065027"/>
+      </p:ext>
+    </p:extLst>
+  </p:cSld>
+  <p:clrMapOvr>
+    <a:masterClrMapping/>
+  </p:clrMapOvr>
+</p:sld>
+</file>
+
+<file path=ppt/slides/slide11.xml><?xml version="1.0" encoding="utf-8"?>
+<p:sld xmlns:a="http://schemas.openxmlformats.org/drawingml/2006/main" xmlns:r="http://schemas.openxmlformats.org/officeDocument/2006/relationships" xmlns:p="http://schemas.openxmlformats.org/presentationml/2006/main">
+  <p:cSld>
+    <p:spTree>
+      <p:nvGrpSpPr>
+        <p:cNvPr id="1" name=""/>
+        <p:cNvGrpSpPr/>
+        <p:nvPr/>
+      </p:nvGrpSpPr>
+      <p:grpSpPr>
+        <a:xfrm>
+          <a:off x="0" y="0"/>
+          <a:ext cx="0" cy="0"/>
+          <a:chOff x="0" y="0"/>
+          <a:chExt cx="0" cy="0"/>
+        </a:xfrm>
+      </p:grpSpPr>
+      <p:sp>
+        <p:nvSpPr>
+          <p:cNvPr id="4" name="Title 3">
+            <a:extLst>
+              <a:ext uri="{FF2B5EF4-FFF2-40B4-BE49-F238E27FC236}">
+                <a16:creationId xmlns:a16="http://schemas.microsoft.com/office/drawing/2014/main" id="{005D637A-74CC-DD47-AE10-98BDED4E05C7}"/>
+              </a:ext>
+            </a:extLst>
+          </p:cNvPr>
+          <p:cNvSpPr>
+            <a:spLocks noGrp="1"/>
+          </p:cNvSpPr>
+          <p:nvPr>
+            <p:ph type="title"/>
+          </p:nvPr>
+        </p:nvSpPr>
+        <p:spPr/>
+        <p:txBody>
+          <a:bodyPr/>
+          <a:lstStyle/>
+          <a:p>
+            <a:endParaRPr lang="en-US" dirty="0"/>
+          </a:p>
+        </p:txBody>
+      </p:sp>
+      <p:sp>
+        <p:nvSpPr>
+          <p:cNvPr id="5" name="Text Placeholder 4">
+            <a:extLst>
+              <a:ext uri="{FF2B5EF4-FFF2-40B4-BE49-F238E27FC236}">
+                <a16:creationId xmlns:a16="http://schemas.microsoft.com/office/drawing/2014/main" id="{F5A29A0F-5A1D-824A-BC7E-B8FEE0694E67}"/>
+              </a:ext>
+            </a:extLst>
+          </p:cNvPr>
+          <p:cNvSpPr>
+            <a:spLocks noGrp="1"/>
+          </p:cNvSpPr>
+          <p:nvPr>
+            <p:ph type="body" idx="1"/>
+          </p:nvPr>
+        </p:nvSpPr>
+        <p:spPr/>
+        <p:txBody>
+          <a:bodyPr/>
+          <a:lstStyle/>
+          <a:p>
+            <a:r>
+              <a:rPr lang="en-US" dirty="0"/>
+              <a:t>Track setup</a:t>
+            </a:r>
+          </a:p>
+        </p:txBody>
+      </p:sp>
+    </p:spTree>
+    <p:extLst>
+      <p:ext uri="{BB962C8B-B14F-4D97-AF65-F5344CB8AC3E}">
+        <p14:creationId xmlns:p14="http://schemas.microsoft.com/office/powerpoint/2010/main" val="1769497375"/>
+      </p:ext>
+    </p:extLst>
+  </p:cSld>
+  <p:clrMapOvr>
+    <a:masterClrMapping/>
+  </p:clrMapOvr>
+</p:sld>
+</file>
+
+<file path=ppt/slides/slide12.xml><?xml version="1.0" encoding="utf-8"?>
+<p:sld xmlns:a="http://schemas.openxmlformats.org/drawingml/2006/main" xmlns:r="http://schemas.openxmlformats.org/officeDocument/2006/relationships" xmlns:p="http://schemas.openxmlformats.org/presentationml/2006/main">
+  <p:cSld>
+    <p:spTree>
+      <p:nvGrpSpPr>
+        <p:cNvPr id="1" name=""/>
+        <p:cNvGrpSpPr/>
+        <p:nvPr/>
+      </p:nvGrpSpPr>
+      <p:grpSpPr>
+        <a:xfrm>
+          <a:off x="0" y="0"/>
+          <a:ext cx="0" cy="0"/>
+          <a:chOff x="0" y="0"/>
+          <a:chExt cx="0" cy="0"/>
+        </a:xfrm>
+      </p:grpSpPr>
+      <p:sp>
+        <p:nvSpPr>
+          <p:cNvPr id="2" name="Title 1">
+            <a:extLst>
+              <a:ext uri="{FF2B5EF4-FFF2-40B4-BE49-F238E27FC236}">
                 <a16:creationId xmlns:a16="http://schemas.microsoft.com/office/drawing/2014/main" id="{EFA7FAF3-676E-8D43-8C2C-8F4C0564C3EA}"/>
               </a:ext>
             </a:extLst>
@@ -3687,7 +3918,7 @@
 </p:sld>
 </file>
 
-<file path=ppt/slides/slide11.xml><?xml version="1.0" encoding="utf-8"?>
+<file path=ppt/slides/slide13.xml><?xml version="1.0" encoding="utf-8"?>
 <p:sld xmlns:a="http://schemas.openxmlformats.org/drawingml/2006/main" xmlns:r="http://schemas.openxmlformats.org/officeDocument/2006/relationships" xmlns:p="http://schemas.openxmlformats.org/presentationml/2006/main">
   <p:cSld>
     <p:spTree>
@@ -3849,7 +4080,7 @@
 </p:sld>
 </file>
 
-<file path=ppt/slides/slide12.xml><?xml version="1.0" encoding="utf-8"?>
+<file path=ppt/slides/slide14.xml><?xml version="1.0" encoding="utf-8"?>
 <p:sld xmlns:a="http://schemas.openxmlformats.org/drawingml/2006/main" xmlns:r="http://schemas.openxmlformats.org/officeDocument/2006/relationships" xmlns:p="http://schemas.openxmlformats.org/presentationml/2006/main">
   <p:cSld>
     <p:spTree>
@@ -3868,6 +4099,89 @@
       </p:grpSpPr>
       <p:sp>
         <p:nvSpPr>
+          <p:cNvPr id="4" name="Title 3">
+            <a:extLst>
+              <a:ext uri="{FF2B5EF4-FFF2-40B4-BE49-F238E27FC236}">
+                <a16:creationId xmlns:a16="http://schemas.microsoft.com/office/drawing/2014/main" id="{005D637A-74CC-DD47-AE10-98BDED4E05C7}"/>
+              </a:ext>
+            </a:extLst>
+          </p:cNvPr>
+          <p:cNvSpPr>
+            <a:spLocks noGrp="1"/>
+          </p:cNvSpPr>
+          <p:nvPr>
+            <p:ph type="title"/>
+          </p:nvPr>
+        </p:nvSpPr>
+        <p:spPr/>
+        <p:txBody>
+          <a:bodyPr/>
+          <a:lstStyle/>
+          <a:p>
+            <a:endParaRPr lang="en-US" dirty="0"/>
+          </a:p>
+        </p:txBody>
+      </p:sp>
+      <p:sp>
+        <p:nvSpPr>
+          <p:cNvPr id="5" name="Text Placeholder 4">
+            <a:extLst>
+              <a:ext uri="{FF2B5EF4-FFF2-40B4-BE49-F238E27FC236}">
+                <a16:creationId xmlns:a16="http://schemas.microsoft.com/office/drawing/2014/main" id="{F5A29A0F-5A1D-824A-BC7E-B8FEE0694E67}"/>
+              </a:ext>
+            </a:extLst>
+          </p:cNvPr>
+          <p:cNvSpPr>
+            <a:spLocks noGrp="1"/>
+          </p:cNvSpPr>
+          <p:nvPr>
+            <p:ph type="body" idx="1"/>
+          </p:nvPr>
+        </p:nvSpPr>
+        <p:spPr/>
+        <p:txBody>
+          <a:bodyPr/>
+          <a:lstStyle/>
+          <a:p>
+            <a:r>
+              <a:rPr lang="en-US" dirty="0"/>
+              <a:t>Scenarios</a:t>
+            </a:r>
+          </a:p>
+        </p:txBody>
+      </p:sp>
+    </p:spTree>
+    <p:extLst>
+      <p:ext uri="{BB962C8B-B14F-4D97-AF65-F5344CB8AC3E}">
+        <p14:creationId xmlns:p14="http://schemas.microsoft.com/office/powerpoint/2010/main" val="918451264"/>
+      </p:ext>
+    </p:extLst>
+  </p:cSld>
+  <p:clrMapOvr>
+    <a:masterClrMapping/>
+  </p:clrMapOvr>
+</p:sld>
+</file>
+
+<file path=ppt/slides/slide15.xml><?xml version="1.0" encoding="utf-8"?>
+<p:sld xmlns:a="http://schemas.openxmlformats.org/drawingml/2006/main" xmlns:r="http://schemas.openxmlformats.org/officeDocument/2006/relationships" xmlns:p="http://schemas.openxmlformats.org/presentationml/2006/main">
+  <p:cSld>
+    <p:spTree>
+      <p:nvGrpSpPr>
+        <p:cNvPr id="1" name=""/>
+        <p:cNvGrpSpPr/>
+        <p:nvPr/>
+      </p:nvGrpSpPr>
+      <p:grpSpPr>
+        <a:xfrm>
+          <a:off x="0" y="0"/>
+          <a:ext cx="0" cy="0"/>
+          <a:chOff x="0" y="0"/>
+          <a:chExt cx="0" cy="0"/>
+        </a:xfrm>
+      </p:grpSpPr>
+      <p:sp>
+        <p:nvSpPr>
           <p:cNvPr id="2" name="Title 1">
             <a:extLst>
               <a:ext uri="{FF2B5EF4-FFF2-40B4-BE49-F238E27FC236}">
@@ -3970,13 +4284,6 @@
             <a:r>
               <a:rPr lang="en-US" dirty="0"/>
               <a:t>Define in one scenario, and include it in any others (within the track)</a:t>
-            </a:r>
-          </a:p>
-          <a:p>
-            <a:pPr lvl="2"/>
-            <a:r>
-              <a:rPr lang="en-US" dirty="0"/>
-              <a:t>Needed for testing</a:t>
             </a:r>
           </a:p>
           <a:p>
@@ -4001,7 +4308,7 @@
 </p:sld>
 </file>
 
-<file path=ppt/slides/slide13.xml><?xml version="1.0" encoding="utf-8"?>
+<file path=ppt/slides/slide16.xml><?xml version="1.0" encoding="utf-8"?>
 <p:sld xmlns:a="http://schemas.openxmlformats.org/drawingml/2006/main" xmlns:r="http://schemas.openxmlformats.org/officeDocument/2006/relationships" xmlns:p="http://schemas.openxmlformats.org/presentationml/2006/main">
   <p:cSld>
     <p:spTree>
@@ -4213,7 +4520,7 @@
 </p:sld>
 </file>
 
-<file path=ppt/slides/slide14.xml><?xml version="1.0" encoding="utf-8"?>
+<file path=ppt/slides/slide17.xml><?xml version="1.0" encoding="utf-8"?>
 <p:sld xmlns:a="http://schemas.openxmlformats.org/drawingml/2006/main" xmlns:r="http://schemas.openxmlformats.org/officeDocument/2006/relationships" xmlns:p="http://schemas.openxmlformats.org/presentationml/2006/main">
   <p:cSld>
     <p:spTree>
@@ -4276,18 +4583,52 @@
         </p:nvSpPr>
         <p:spPr>
           <a:xfrm>
-            <a:off x="7103076" y="1959146"/>
-            <a:ext cx="4250724" cy="2637567"/>
+            <a:off x="7103075" y="1959146"/>
+            <a:ext cx="4969475" cy="4701146"/>
           </a:xfrm>
         </p:spPr>
         <p:txBody>
-          <a:bodyPr/>
+          <a:bodyPr>
+            <a:normAutofit/>
+          </a:bodyPr>
           <a:lstStyle/>
           <a:p>
             <a:r>
               <a:rPr lang="en-US" dirty="0"/>
               <a:t>At least have description and roles</a:t>
             </a:r>
+          </a:p>
+          <a:p>
+            <a:r>
+              <a:rPr lang="en-US" dirty="0"/>
+              <a:t>Roles:</a:t>
+            </a:r>
+          </a:p>
+          <a:p>
+            <a:pPr lvl="1"/>
+            <a:r>
+              <a:rPr lang="en-US" dirty="0"/>
+              <a:t>Want at least 1 client &amp; 1 server</a:t>
+            </a:r>
+          </a:p>
+          <a:p>
+            <a:pPr lvl="1"/>
+            <a:r>
+              <a:rPr lang="en-US" dirty="0"/>
+              <a:t>May have other roles</a:t>
+            </a:r>
+          </a:p>
+          <a:p>
+            <a:pPr lvl="2"/>
+            <a:r>
+              <a:rPr lang="en-US" dirty="0"/>
+              <a:t>Each role is a client or </a:t>
+            </a:r>
+            <a:r>
+              <a:rPr lang="en-US" dirty="0" err="1"/>
+              <a:t>aserver</a:t>
+            </a:r>
+            <a:endParaRPr lang="en-US" dirty="0"/>
           </a:p>
           <a:p>
             <a:r>
@@ -4340,7 +4681,7 @@
 </p:sld>
 </file>
 
-<file path=ppt/slides/slide15.xml><?xml version="1.0" encoding="utf-8"?>
+<file path=ppt/slides/slide18.xml><?xml version="1.0" encoding="utf-8"?>
 <p:sld xmlns:a="http://schemas.openxmlformats.org/drawingml/2006/main" xmlns:r="http://schemas.openxmlformats.org/officeDocument/2006/relationships" xmlns:p="http://schemas.openxmlformats.org/presentationml/2006/main">
   <p:cSld>
     <p:spTree>
@@ -4423,7 +4764,7 @@
 </p:sld>
 </file>
 
-<file path=ppt/slides/slide16.xml><?xml version="1.0" encoding="utf-8"?>
+<file path=ppt/slides/slide19.xml><?xml version="1.0" encoding="utf-8"?>
 <p:sld xmlns:a="http://schemas.openxmlformats.org/drawingml/2006/main" xmlns:r="http://schemas.openxmlformats.org/officeDocument/2006/relationships" xmlns:p="http://schemas.openxmlformats.org/presentationml/2006/main">
   <p:cSld>
     <p:spTree>
@@ -4505,7 +4846,7 @@
             </a:pPr>
             <a:r>
               <a:rPr lang="en-US" dirty="0"/>
-              <a:t>Servers</a:t>
+              <a:t>Record servers the user has</a:t>
             </a:r>
           </a:p>
           <a:p>
@@ -4515,7 +4856,7 @@
             </a:pPr>
             <a:r>
               <a:rPr lang="en-US" dirty="0"/>
-              <a:t>Clients</a:t>
+              <a:t>Record clients the user has</a:t>
             </a:r>
           </a:p>
           <a:p>
@@ -4525,7 +4866,7 @@
             </a:pPr>
             <a:r>
               <a:rPr lang="en-US" dirty="0"/>
-              <a:t>Testing</a:t>
+              <a:t>Record outcomes of testing</a:t>
             </a:r>
           </a:p>
           <a:p>
@@ -4547,7 +4888,257 @@
 </p:sld>
 </file>
 
-<file path=ppt/slides/slide17.xml><?xml version="1.0" encoding="utf-8"?>
+<file path=ppt/slides/slide2.xml><?xml version="1.0" encoding="utf-8"?>
+<p:sld xmlns:a="http://schemas.openxmlformats.org/drawingml/2006/main" xmlns:r="http://schemas.openxmlformats.org/officeDocument/2006/relationships" xmlns:p="http://schemas.openxmlformats.org/presentationml/2006/main">
+  <p:cSld>
+    <p:spTree>
+      <p:nvGrpSpPr>
+        <p:cNvPr id="1" name=""/>
+        <p:cNvGrpSpPr/>
+        <p:nvPr/>
+      </p:nvGrpSpPr>
+      <p:grpSpPr>
+        <a:xfrm>
+          <a:off x="0" y="0"/>
+          <a:ext cx="0" cy="0"/>
+          <a:chOff x="0" y="0"/>
+          <a:chExt cx="0" cy="0"/>
+        </a:xfrm>
+      </p:grpSpPr>
+      <p:sp>
+        <p:nvSpPr>
+          <p:cNvPr id="2" name="Title 1">
+            <a:extLst>
+              <a:ext uri="{FF2B5EF4-FFF2-40B4-BE49-F238E27FC236}">
+                <a16:creationId xmlns:a16="http://schemas.microsoft.com/office/drawing/2014/main" id="{58D2708A-8E0B-214C-AB19-E35754BF3AFF}"/>
+              </a:ext>
+            </a:extLst>
+          </p:cNvPr>
+          <p:cNvSpPr>
+            <a:spLocks noGrp="1"/>
+          </p:cNvSpPr>
+          <p:nvPr>
+            <p:ph type="title"/>
+          </p:nvPr>
+        </p:nvSpPr>
+        <p:spPr/>
+        <p:txBody>
+          <a:bodyPr/>
+          <a:lstStyle/>
+          <a:p>
+            <a:r>
+              <a:rPr lang="en-US" dirty="0"/>
+              <a:t>TL;DR</a:t>
+            </a:r>
+          </a:p>
+        </p:txBody>
+      </p:sp>
+      <p:sp>
+        <p:nvSpPr>
+          <p:cNvPr id="3" name="Content Placeholder 2">
+            <a:extLst>
+              <a:ext uri="{FF2B5EF4-FFF2-40B4-BE49-F238E27FC236}">
+                <a16:creationId xmlns:a16="http://schemas.microsoft.com/office/drawing/2014/main" id="{B1063D6B-9ACE-6049-ACE6-B29083DAE05F}"/>
+              </a:ext>
+            </a:extLst>
+          </p:cNvPr>
+          <p:cNvSpPr>
+            <a:spLocks noGrp="1"/>
+          </p:cNvSpPr>
+          <p:nvPr>
+            <p:ph idx="1"/>
+          </p:nvPr>
+        </p:nvSpPr>
+        <p:spPr>
+          <a:xfrm>
+            <a:off x="838200" y="1825624"/>
+            <a:ext cx="9479692" cy="4216829"/>
+          </a:xfrm>
+        </p:spPr>
+        <p:txBody>
+          <a:bodyPr>
+            <a:normAutofit fontScale="92500"/>
+          </a:bodyPr>
+          <a:lstStyle/>
+          <a:p>
+            <a:pPr marL="0" indent="0" algn="ctr">
+              <a:buNone/>
+            </a:pPr>
+            <a:r>
+              <a:rPr lang="en-US" dirty="0"/>
+              <a:t>List connectathon tracks, implementation guides, servers, clients and participants in the connectathon to make it easier for people to understand the range of activities in the Connectathon event.</a:t>
+            </a:r>
+          </a:p>
+          <a:p>
+            <a:pPr marL="0" indent="0" algn="ctr">
+              <a:buNone/>
+            </a:pPr>
+            <a:endParaRPr lang="en-US" dirty="0"/>
+          </a:p>
+          <a:p>
+            <a:pPr marL="0" indent="0" algn="ctr">
+              <a:buNone/>
+            </a:pPr>
+            <a:r>
+              <a:rPr lang="en-US" dirty="0"/>
+              <a:t>Allows testing results to be recorded for tracks (especially Implementation guides) to assist with determining IG maturity.</a:t>
+            </a:r>
+          </a:p>
+          <a:p>
+            <a:pPr marL="0" indent="0" algn="ctr">
+              <a:buNone/>
+            </a:pPr>
+            <a:endParaRPr lang="en-US" dirty="0"/>
+          </a:p>
+          <a:p>
+            <a:pPr marL="0" indent="0" algn="ctr">
+              <a:buNone/>
+            </a:pPr>
+            <a:r>
+              <a:rPr lang="en-US" dirty="0"/>
+              <a:t>Provide links to other Connectathon artifacts such as Confluence pages, IG’s on the web and the FHIR Package registry</a:t>
+            </a:r>
+          </a:p>
+          <a:p>
+            <a:pPr marL="0" indent="0" algn="ctr">
+              <a:buNone/>
+            </a:pPr>
+            <a:endParaRPr lang="en-US" dirty="0"/>
+          </a:p>
+        </p:txBody>
+      </p:sp>
+      <p:sp>
+        <p:nvSpPr>
+          <p:cNvPr id="4" name="TextBox 3">
+            <a:extLst>
+              <a:ext uri="{FF2B5EF4-FFF2-40B4-BE49-F238E27FC236}">
+                <a16:creationId xmlns:a16="http://schemas.microsoft.com/office/drawing/2014/main" id="{7A71CE76-5BAD-584D-89AB-A73F35556F06}"/>
+              </a:ext>
+            </a:extLst>
+          </p:cNvPr>
+          <p:cNvSpPr txBox="1"/>
+          <p:nvPr/>
+        </p:nvSpPr>
+        <p:spPr>
+          <a:xfrm>
+            <a:off x="2113006" y="6301945"/>
+            <a:ext cx="7745390" cy="369332"/>
+          </a:xfrm>
+          <a:prstGeom prst="rect">
+            <a:avLst/>
+          </a:prstGeom>
+          <a:noFill/>
+        </p:spPr>
+        <p:txBody>
+          <a:bodyPr wrap="none" rtlCol="0">
+            <a:spAutoFit/>
+          </a:bodyPr>
+          <a:lstStyle/>
+          <a:p>
+            <a:r>
+              <a:rPr lang="en-US" dirty="0"/>
+              <a:t>Note: Works with any modern browser, with the exception of the Brave Browser</a:t>
+            </a:r>
+          </a:p>
+        </p:txBody>
+      </p:sp>
+    </p:spTree>
+    <p:extLst>
+      <p:ext uri="{BB962C8B-B14F-4D97-AF65-F5344CB8AC3E}">
+        <p14:creationId xmlns:p14="http://schemas.microsoft.com/office/powerpoint/2010/main" val="1094743428"/>
+      </p:ext>
+    </p:extLst>
+  </p:cSld>
+  <p:clrMapOvr>
+    <a:masterClrMapping/>
+  </p:clrMapOvr>
+</p:sld>
+</file>
+
+<file path=ppt/slides/slide20.xml><?xml version="1.0" encoding="utf-8"?>
+<p:sld xmlns:a="http://schemas.openxmlformats.org/drawingml/2006/main" xmlns:r="http://schemas.openxmlformats.org/officeDocument/2006/relationships" xmlns:p="http://schemas.openxmlformats.org/presentationml/2006/main">
+  <p:cSld>
+    <p:spTree>
+      <p:nvGrpSpPr>
+        <p:cNvPr id="1" name=""/>
+        <p:cNvGrpSpPr/>
+        <p:nvPr/>
+      </p:nvGrpSpPr>
+      <p:grpSpPr>
+        <a:xfrm>
+          <a:off x="0" y="0"/>
+          <a:ext cx="0" cy="0"/>
+          <a:chOff x="0" y="0"/>
+          <a:chExt cx="0" cy="0"/>
+        </a:xfrm>
+      </p:grpSpPr>
+      <p:sp>
+        <p:nvSpPr>
+          <p:cNvPr id="4" name="Title 3">
+            <a:extLst>
+              <a:ext uri="{FF2B5EF4-FFF2-40B4-BE49-F238E27FC236}">
+                <a16:creationId xmlns:a16="http://schemas.microsoft.com/office/drawing/2014/main" id="{005D637A-74CC-DD47-AE10-98BDED4E05C7}"/>
+              </a:ext>
+            </a:extLst>
+          </p:cNvPr>
+          <p:cNvSpPr>
+            <a:spLocks noGrp="1"/>
+          </p:cNvSpPr>
+          <p:nvPr>
+            <p:ph type="title"/>
+          </p:nvPr>
+        </p:nvSpPr>
+        <p:spPr/>
+        <p:txBody>
+          <a:bodyPr/>
+          <a:lstStyle/>
+          <a:p>
+            <a:endParaRPr lang="en-US" dirty="0"/>
+          </a:p>
+        </p:txBody>
+      </p:sp>
+      <p:sp>
+        <p:nvSpPr>
+          <p:cNvPr id="5" name="Text Placeholder 4">
+            <a:extLst>
+              <a:ext uri="{FF2B5EF4-FFF2-40B4-BE49-F238E27FC236}">
+                <a16:creationId xmlns:a16="http://schemas.microsoft.com/office/drawing/2014/main" id="{F5A29A0F-5A1D-824A-BC7E-B8FEE0694E67}"/>
+              </a:ext>
+            </a:extLst>
+          </p:cNvPr>
+          <p:cNvSpPr>
+            <a:spLocks noGrp="1"/>
+          </p:cNvSpPr>
+          <p:nvPr>
+            <p:ph type="body" idx="1"/>
+          </p:nvPr>
+        </p:nvSpPr>
+        <p:spPr/>
+        <p:txBody>
+          <a:bodyPr/>
+          <a:lstStyle/>
+          <a:p>
+            <a:r>
+              <a:rPr lang="en-US" dirty="0"/>
+              <a:t>Person setup</a:t>
+            </a:r>
+          </a:p>
+        </p:txBody>
+      </p:sp>
+    </p:spTree>
+    <p:extLst>
+      <p:ext uri="{BB962C8B-B14F-4D97-AF65-F5344CB8AC3E}">
+        <p14:creationId xmlns:p14="http://schemas.microsoft.com/office/powerpoint/2010/main" val="1028524368"/>
+      </p:ext>
+    </p:extLst>
+  </p:cSld>
+  <p:clrMapOvr>
+    <a:masterClrMapping/>
+  </p:clrMapOvr>
+</p:sld>
+</file>
+
+<file path=ppt/slides/slide21.xml><?xml version="1.0" encoding="utf-8"?>
 <p:sld xmlns:a="http://schemas.openxmlformats.org/drawingml/2006/main" xmlns:r="http://schemas.openxmlformats.org/officeDocument/2006/relationships" xmlns:p="http://schemas.openxmlformats.org/presentationml/2006/main">
   <p:cSld>
     <p:spTree>
@@ -4848,7 +5439,7 @@
 </p:sld>
 </file>
 
-<file path=ppt/slides/slide18.xml><?xml version="1.0" encoding="utf-8"?>
+<file path=ppt/slides/slide22.xml><?xml version="1.0" encoding="utf-8"?>
 <p:sld xmlns:a="http://schemas.openxmlformats.org/drawingml/2006/main" xmlns:r="http://schemas.openxmlformats.org/officeDocument/2006/relationships" xmlns:p="http://schemas.openxmlformats.org/presentationml/2006/main">
   <p:cSld>
     <p:spTree>
@@ -4987,7 +5578,90 @@
 </p:sld>
 </file>
 
-<file path=ppt/slides/slide19.xml><?xml version="1.0" encoding="utf-8"?>
+<file path=ppt/slides/slide23.xml><?xml version="1.0" encoding="utf-8"?>
+<p:sld xmlns:a="http://schemas.openxmlformats.org/drawingml/2006/main" xmlns:r="http://schemas.openxmlformats.org/officeDocument/2006/relationships" xmlns:p="http://schemas.openxmlformats.org/presentationml/2006/main">
+  <p:cSld>
+    <p:spTree>
+      <p:nvGrpSpPr>
+        <p:cNvPr id="1" name=""/>
+        <p:cNvGrpSpPr/>
+        <p:nvPr/>
+      </p:nvGrpSpPr>
+      <p:grpSpPr>
+        <a:xfrm>
+          <a:off x="0" y="0"/>
+          <a:ext cx="0" cy="0"/>
+          <a:chOff x="0" y="0"/>
+          <a:chExt cx="0" cy="0"/>
+        </a:xfrm>
+      </p:grpSpPr>
+      <p:sp>
+        <p:nvSpPr>
+          <p:cNvPr id="4" name="Title 3">
+            <a:extLst>
+              <a:ext uri="{FF2B5EF4-FFF2-40B4-BE49-F238E27FC236}">
+                <a16:creationId xmlns:a16="http://schemas.microsoft.com/office/drawing/2014/main" id="{005D637A-74CC-DD47-AE10-98BDED4E05C7}"/>
+              </a:ext>
+            </a:extLst>
+          </p:cNvPr>
+          <p:cNvSpPr>
+            <a:spLocks noGrp="1"/>
+          </p:cNvSpPr>
+          <p:nvPr>
+            <p:ph type="title"/>
+          </p:nvPr>
+        </p:nvSpPr>
+        <p:spPr/>
+        <p:txBody>
+          <a:bodyPr/>
+          <a:lstStyle/>
+          <a:p>
+            <a:endParaRPr lang="en-US" dirty="0"/>
+          </a:p>
+        </p:txBody>
+      </p:sp>
+      <p:sp>
+        <p:nvSpPr>
+          <p:cNvPr id="5" name="Text Placeholder 4">
+            <a:extLst>
+              <a:ext uri="{FF2B5EF4-FFF2-40B4-BE49-F238E27FC236}">
+                <a16:creationId xmlns:a16="http://schemas.microsoft.com/office/drawing/2014/main" id="{F5A29A0F-5A1D-824A-BC7E-B8FEE0694E67}"/>
+              </a:ext>
+            </a:extLst>
+          </p:cNvPr>
+          <p:cNvSpPr>
+            <a:spLocks noGrp="1"/>
+          </p:cNvSpPr>
+          <p:nvPr>
+            <p:ph type="body" idx="1"/>
+          </p:nvPr>
+        </p:nvSpPr>
+        <p:spPr/>
+        <p:txBody>
+          <a:bodyPr/>
+          <a:lstStyle/>
+          <a:p>
+            <a:r>
+              <a:rPr lang="en-US" dirty="0"/>
+              <a:t>Server setup</a:t>
+            </a:r>
+          </a:p>
+        </p:txBody>
+      </p:sp>
+    </p:spTree>
+    <p:extLst>
+      <p:ext uri="{BB962C8B-B14F-4D97-AF65-F5344CB8AC3E}">
+        <p14:creationId xmlns:p14="http://schemas.microsoft.com/office/powerpoint/2010/main" val="1837581045"/>
+      </p:ext>
+    </p:extLst>
+  </p:cSld>
+  <p:clrMapOvr>
+    <a:masterClrMapping/>
+  </p:clrMapOvr>
+</p:sld>
+</file>
+
+<file path=ppt/slides/slide24.xml><?xml version="1.0" encoding="utf-8"?>
 <p:sld xmlns:a="http://schemas.openxmlformats.org/drawingml/2006/main" xmlns:r="http://schemas.openxmlformats.org/officeDocument/2006/relationships" xmlns:p="http://schemas.openxmlformats.org/presentationml/2006/main">
   <p:cSld>
     <p:spTree>
@@ -5232,174 +5906,7 @@
 </p:sld>
 </file>
 
-<file path=ppt/slides/slide2.xml><?xml version="1.0" encoding="utf-8"?>
-<p:sld xmlns:a="http://schemas.openxmlformats.org/drawingml/2006/main" xmlns:r="http://schemas.openxmlformats.org/officeDocument/2006/relationships" xmlns:p="http://schemas.openxmlformats.org/presentationml/2006/main">
-  <p:cSld>
-    <p:spTree>
-      <p:nvGrpSpPr>
-        <p:cNvPr id="1" name=""/>
-        <p:cNvGrpSpPr/>
-        <p:nvPr/>
-      </p:nvGrpSpPr>
-      <p:grpSpPr>
-        <a:xfrm>
-          <a:off x="0" y="0"/>
-          <a:ext cx="0" cy="0"/>
-          <a:chOff x="0" y="0"/>
-          <a:chExt cx="0" cy="0"/>
-        </a:xfrm>
-      </p:grpSpPr>
-      <p:sp>
-        <p:nvSpPr>
-          <p:cNvPr id="2" name="Title 1">
-            <a:extLst>
-              <a:ext uri="{FF2B5EF4-FFF2-40B4-BE49-F238E27FC236}">
-                <a16:creationId xmlns:a16="http://schemas.microsoft.com/office/drawing/2014/main" id="{58D2708A-8E0B-214C-AB19-E35754BF3AFF}"/>
-              </a:ext>
-            </a:extLst>
-          </p:cNvPr>
-          <p:cNvSpPr>
-            <a:spLocks noGrp="1"/>
-          </p:cNvSpPr>
-          <p:nvPr>
-            <p:ph type="title"/>
-          </p:nvPr>
-        </p:nvSpPr>
-        <p:spPr/>
-        <p:txBody>
-          <a:bodyPr/>
-          <a:lstStyle/>
-          <a:p>
-            <a:r>
-              <a:rPr lang="en-US" dirty="0"/>
-              <a:t>TLDR</a:t>
-            </a:r>
-          </a:p>
-        </p:txBody>
-      </p:sp>
-      <p:sp>
-        <p:nvSpPr>
-          <p:cNvPr id="3" name="Content Placeholder 2">
-            <a:extLst>
-              <a:ext uri="{FF2B5EF4-FFF2-40B4-BE49-F238E27FC236}">
-                <a16:creationId xmlns:a16="http://schemas.microsoft.com/office/drawing/2014/main" id="{B1063D6B-9ACE-6049-ACE6-B29083DAE05F}"/>
-              </a:ext>
-            </a:extLst>
-          </p:cNvPr>
-          <p:cNvSpPr>
-            <a:spLocks noGrp="1"/>
-          </p:cNvSpPr>
-          <p:nvPr>
-            <p:ph idx="1"/>
-          </p:nvPr>
-        </p:nvSpPr>
-        <p:spPr>
-          <a:xfrm>
-            <a:off x="838200" y="1825624"/>
-            <a:ext cx="9479692" cy="4216829"/>
-          </a:xfrm>
-        </p:spPr>
-        <p:txBody>
-          <a:bodyPr>
-            <a:normAutofit fontScale="92500"/>
-          </a:bodyPr>
-          <a:lstStyle/>
-          <a:p>
-            <a:pPr marL="0" indent="0" algn="ctr">
-              <a:buNone/>
-            </a:pPr>
-            <a:r>
-              <a:rPr lang="en-US" dirty="0"/>
-              <a:t>List connectathon tracks, implementation guides, servers, clients and participants in the connectathon to make it easier for people to understand the range of activities in the Connectathon event.</a:t>
-            </a:r>
-          </a:p>
-          <a:p>
-            <a:pPr marL="0" indent="0" algn="ctr">
-              <a:buNone/>
-            </a:pPr>
-            <a:endParaRPr lang="en-US" dirty="0"/>
-          </a:p>
-          <a:p>
-            <a:pPr marL="0" indent="0" algn="ctr">
-              <a:buNone/>
-            </a:pPr>
-            <a:r>
-              <a:rPr lang="en-US" dirty="0"/>
-              <a:t>Allows testing results to be recorded for tracks (especially Implementation guides) to assist with determining IG maturity.</a:t>
-            </a:r>
-          </a:p>
-          <a:p>
-            <a:pPr marL="0" indent="0" algn="ctr">
-              <a:buNone/>
-            </a:pPr>
-            <a:endParaRPr lang="en-US" dirty="0"/>
-          </a:p>
-          <a:p>
-            <a:pPr marL="0" indent="0" algn="ctr">
-              <a:buNone/>
-            </a:pPr>
-            <a:r>
-              <a:rPr lang="en-US" dirty="0"/>
-              <a:t>Provide links to other Connectathon artifacts such as Confluence pages, IG’s on the web and the FHIR Package registry</a:t>
-            </a:r>
-          </a:p>
-          <a:p>
-            <a:pPr marL="0" indent="0" algn="ctr">
-              <a:buNone/>
-            </a:pPr>
-            <a:endParaRPr lang="en-US" dirty="0"/>
-          </a:p>
-        </p:txBody>
-      </p:sp>
-      <p:sp>
-        <p:nvSpPr>
-          <p:cNvPr id="4" name="TextBox 3">
-            <a:extLst>
-              <a:ext uri="{FF2B5EF4-FFF2-40B4-BE49-F238E27FC236}">
-                <a16:creationId xmlns:a16="http://schemas.microsoft.com/office/drawing/2014/main" id="{7A71CE76-5BAD-584D-89AB-A73F35556F06}"/>
-              </a:ext>
-            </a:extLst>
-          </p:cNvPr>
-          <p:cNvSpPr txBox="1"/>
-          <p:nvPr/>
-        </p:nvSpPr>
-        <p:spPr>
-          <a:xfrm>
-            <a:off x="2113006" y="6301945"/>
-            <a:ext cx="7745390" cy="369332"/>
-          </a:xfrm>
-          <a:prstGeom prst="rect">
-            <a:avLst/>
-          </a:prstGeom>
-          <a:noFill/>
-        </p:spPr>
-        <p:txBody>
-          <a:bodyPr wrap="none" rtlCol="0">
-            <a:spAutoFit/>
-          </a:bodyPr>
-          <a:lstStyle/>
-          <a:p>
-            <a:r>
-              <a:rPr lang="en-US" dirty="0"/>
-              <a:t>Note: Works with any modern browser, with the exception of the Brave Browser</a:t>
-            </a:r>
-          </a:p>
-        </p:txBody>
-      </p:sp>
-    </p:spTree>
-    <p:extLst>
-      <p:ext uri="{BB962C8B-B14F-4D97-AF65-F5344CB8AC3E}">
-        <p14:creationId xmlns:p14="http://schemas.microsoft.com/office/powerpoint/2010/main" val="1094743428"/>
-      </p:ext>
-    </p:extLst>
-  </p:cSld>
-  <p:clrMapOvr>
-    <a:masterClrMapping/>
-  </p:clrMapOvr>
-</p:sld>
-</file>
-
-<file path=ppt/slides/slide20.xml><?xml version="1.0" encoding="utf-8"?>
+<file path=ppt/slides/slide25.xml><?xml version="1.0" encoding="utf-8"?>
 <p:sld xmlns:a="http://schemas.openxmlformats.org/drawingml/2006/main" xmlns:r="http://schemas.openxmlformats.org/officeDocument/2006/relationships" xmlns:p="http://schemas.openxmlformats.org/presentationml/2006/main">
   <p:cSld>
     <p:spTree>
@@ -5565,7 +6072,90 @@
 </p:sld>
 </file>
 
-<file path=ppt/slides/slide21.xml><?xml version="1.0" encoding="utf-8"?>
+<file path=ppt/slides/slide26.xml><?xml version="1.0" encoding="utf-8"?>
+<p:sld xmlns:a="http://schemas.openxmlformats.org/drawingml/2006/main" xmlns:r="http://schemas.openxmlformats.org/officeDocument/2006/relationships" xmlns:p="http://schemas.openxmlformats.org/presentationml/2006/main">
+  <p:cSld>
+    <p:spTree>
+      <p:nvGrpSpPr>
+        <p:cNvPr id="1" name=""/>
+        <p:cNvGrpSpPr/>
+        <p:nvPr/>
+      </p:nvGrpSpPr>
+      <p:grpSpPr>
+        <a:xfrm>
+          <a:off x="0" y="0"/>
+          <a:ext cx="0" cy="0"/>
+          <a:chOff x="0" y="0"/>
+          <a:chExt cx="0" cy="0"/>
+        </a:xfrm>
+      </p:grpSpPr>
+      <p:sp>
+        <p:nvSpPr>
+          <p:cNvPr id="4" name="Title 3">
+            <a:extLst>
+              <a:ext uri="{FF2B5EF4-FFF2-40B4-BE49-F238E27FC236}">
+                <a16:creationId xmlns:a16="http://schemas.microsoft.com/office/drawing/2014/main" id="{005D637A-74CC-DD47-AE10-98BDED4E05C7}"/>
+              </a:ext>
+            </a:extLst>
+          </p:cNvPr>
+          <p:cNvSpPr>
+            <a:spLocks noGrp="1"/>
+          </p:cNvSpPr>
+          <p:nvPr>
+            <p:ph type="title"/>
+          </p:nvPr>
+        </p:nvSpPr>
+        <p:spPr/>
+        <p:txBody>
+          <a:bodyPr/>
+          <a:lstStyle/>
+          <a:p>
+            <a:endParaRPr lang="en-US" dirty="0"/>
+          </a:p>
+        </p:txBody>
+      </p:sp>
+      <p:sp>
+        <p:nvSpPr>
+          <p:cNvPr id="5" name="Text Placeholder 4">
+            <a:extLst>
+              <a:ext uri="{FF2B5EF4-FFF2-40B4-BE49-F238E27FC236}">
+                <a16:creationId xmlns:a16="http://schemas.microsoft.com/office/drawing/2014/main" id="{F5A29A0F-5A1D-824A-BC7E-B8FEE0694E67}"/>
+              </a:ext>
+            </a:extLst>
+          </p:cNvPr>
+          <p:cNvSpPr>
+            <a:spLocks noGrp="1"/>
+          </p:cNvSpPr>
+          <p:nvPr>
+            <p:ph type="body" idx="1"/>
+          </p:nvPr>
+        </p:nvSpPr>
+        <p:spPr/>
+        <p:txBody>
+          <a:bodyPr/>
+          <a:lstStyle/>
+          <a:p>
+            <a:r>
+              <a:rPr lang="en-US" dirty="0"/>
+              <a:t>Client setup</a:t>
+            </a:r>
+          </a:p>
+        </p:txBody>
+      </p:sp>
+    </p:spTree>
+    <p:extLst>
+      <p:ext uri="{BB962C8B-B14F-4D97-AF65-F5344CB8AC3E}">
+        <p14:creationId xmlns:p14="http://schemas.microsoft.com/office/powerpoint/2010/main" val="2584771714"/>
+      </p:ext>
+    </p:extLst>
+  </p:cSld>
+  <p:clrMapOvr>
+    <a:masterClrMapping/>
+  </p:clrMapOvr>
+</p:sld>
+</file>
+
+<file path=ppt/slides/slide27.xml><?xml version="1.0" encoding="utf-8"?>
 <p:sld xmlns:a="http://schemas.openxmlformats.org/drawingml/2006/main" xmlns:r="http://schemas.openxmlformats.org/officeDocument/2006/relationships" xmlns:p="http://schemas.openxmlformats.org/presentationml/2006/main">
   <p:cSld>
     <p:spTree>
@@ -5700,7 +6290,7 @@
 </p:sld>
 </file>
 
-<file path=ppt/slides/slide22.xml><?xml version="1.0" encoding="utf-8"?>
+<file path=ppt/slides/slide28.xml><?xml version="1.0" encoding="utf-8"?>
 <p:sld xmlns:a="http://schemas.openxmlformats.org/drawingml/2006/main" xmlns:r="http://schemas.openxmlformats.org/officeDocument/2006/relationships" xmlns:p="http://schemas.openxmlformats.org/presentationml/2006/main">
   <p:cSld>
     <p:spTree>
@@ -5719,10 +6309,10 @@
       </p:grpSpPr>
       <p:sp>
         <p:nvSpPr>
-          <p:cNvPr id="2" name="Title 1">
-            <a:extLst>
-              <a:ext uri="{FF2B5EF4-FFF2-40B4-BE49-F238E27FC236}">
-                <a16:creationId xmlns:a16="http://schemas.microsoft.com/office/drawing/2014/main" id="{C86CCF4A-B9C1-6049-8F39-A134314F7744}"/>
+          <p:cNvPr id="4" name="Title 3">
+            <a:extLst>
+              <a:ext uri="{FF2B5EF4-FFF2-40B4-BE49-F238E27FC236}">
+                <a16:creationId xmlns:a16="http://schemas.microsoft.com/office/drawing/2014/main" id="{005D637A-74CC-DD47-AE10-98BDED4E05C7}"/>
               </a:ext>
             </a:extLst>
           </p:cNvPr>
@@ -5738,27 +6328,24 @@
           <a:bodyPr/>
           <a:lstStyle/>
           <a:p>
-            <a:r>
-              <a:rPr lang="en-US" dirty="0"/>
-              <a:t>4a Testing</a:t>
-            </a:r>
-          </a:p>
-        </p:txBody>
-      </p:sp>
-      <p:sp>
-        <p:nvSpPr>
-          <p:cNvPr id="3" name="Content Placeholder 2">
-            <a:extLst>
-              <a:ext uri="{FF2B5EF4-FFF2-40B4-BE49-F238E27FC236}">
-                <a16:creationId xmlns:a16="http://schemas.microsoft.com/office/drawing/2014/main" id="{3A7C3BC1-C985-E043-A4ED-19AAC49039F6}"/>
-              </a:ext>
-            </a:extLst>
-          </p:cNvPr>
-          <p:cNvSpPr>
-            <a:spLocks noGrp="1"/>
-          </p:cNvSpPr>
-          <p:nvPr>
-            <p:ph idx="1"/>
+            <a:endParaRPr lang="en-US" dirty="0"/>
+          </a:p>
+        </p:txBody>
+      </p:sp>
+      <p:sp>
+        <p:nvSpPr>
+          <p:cNvPr id="5" name="Text Placeholder 4">
+            <a:extLst>
+              <a:ext uri="{FF2B5EF4-FFF2-40B4-BE49-F238E27FC236}">
+                <a16:creationId xmlns:a16="http://schemas.microsoft.com/office/drawing/2014/main" id="{F5A29A0F-5A1D-824A-BC7E-B8FEE0694E67}"/>
+              </a:ext>
+            </a:extLst>
+          </p:cNvPr>
+          <p:cNvSpPr>
+            <a:spLocks noGrp="1"/>
+          </p:cNvSpPr>
+          <p:nvPr>
+            <p:ph type="body" idx="1"/>
           </p:nvPr>
         </p:nvSpPr>
         <p:spPr/>
@@ -5768,33 +6355,7 @@
           <a:p>
             <a:r>
               <a:rPr lang="en-US" dirty="0"/>
-              <a:t>Allows recording of test results</a:t>
-            </a:r>
-          </a:p>
-          <a:p>
-            <a:r>
-              <a:rPr lang="en-US" dirty="0"/>
-              <a:t>A client accessing a server – each in some specific role</a:t>
-            </a:r>
-          </a:p>
-          <a:p>
-            <a:r>
-              <a:rPr lang="en-US" dirty="0"/>
-              <a:t>2 parts:</a:t>
-            </a:r>
-          </a:p>
-          <a:p>
-            <a:pPr lvl="1"/>
-            <a:r>
-              <a:rPr lang="en-US" dirty="0"/>
-              <a:t>Recording a test result is from the ‘Track details &amp; testing’ tab</a:t>
-            </a:r>
-          </a:p>
-          <a:p>
-            <a:pPr lvl="1"/>
-            <a:r>
-              <a:rPr lang="en-US" dirty="0"/>
-              <a:t>All results in the ‘Test Results’ tab</a:t>
+              <a:t>Testing</a:t>
             </a:r>
           </a:p>
         </p:txBody>
@@ -5802,7 +6363,7 @@
     </p:spTree>
     <p:extLst>
       <p:ext uri="{BB962C8B-B14F-4D97-AF65-F5344CB8AC3E}">
-        <p14:creationId xmlns:p14="http://schemas.microsoft.com/office/powerpoint/2010/main" val="2101032508"/>
+        <p14:creationId xmlns:p14="http://schemas.microsoft.com/office/powerpoint/2010/main" val="1014063353"/>
       </p:ext>
     </p:extLst>
   </p:cSld>
@@ -5812,7 +6373,7 @@
 </p:sld>
 </file>
 
-<file path=ppt/slides/slide23.xml><?xml version="1.0" encoding="utf-8"?>
+<file path=ppt/slides/slide29.xml><?xml version="1.0" encoding="utf-8"?>
 <p:sld xmlns:a="http://schemas.openxmlformats.org/drawingml/2006/main" xmlns:r="http://schemas.openxmlformats.org/officeDocument/2006/relationships" xmlns:p="http://schemas.openxmlformats.org/presentationml/2006/main">
   <p:cSld>
     <p:spTree>
@@ -5834,6 +6395,287 @@
           <p:cNvPr id="2" name="Title 1">
             <a:extLst>
               <a:ext uri="{FF2B5EF4-FFF2-40B4-BE49-F238E27FC236}">
+                <a16:creationId xmlns:a16="http://schemas.microsoft.com/office/drawing/2014/main" id="{C86CCF4A-B9C1-6049-8F39-A134314F7744}"/>
+              </a:ext>
+            </a:extLst>
+          </p:cNvPr>
+          <p:cNvSpPr>
+            <a:spLocks noGrp="1"/>
+          </p:cNvSpPr>
+          <p:nvPr>
+            <p:ph type="title"/>
+          </p:nvPr>
+        </p:nvSpPr>
+        <p:spPr/>
+        <p:txBody>
+          <a:bodyPr/>
+          <a:lstStyle/>
+          <a:p>
+            <a:r>
+              <a:rPr lang="en-US" dirty="0"/>
+              <a:t>4a Testing</a:t>
+            </a:r>
+          </a:p>
+        </p:txBody>
+      </p:sp>
+      <p:sp>
+        <p:nvSpPr>
+          <p:cNvPr id="3" name="Content Placeholder 2">
+            <a:extLst>
+              <a:ext uri="{FF2B5EF4-FFF2-40B4-BE49-F238E27FC236}">
+                <a16:creationId xmlns:a16="http://schemas.microsoft.com/office/drawing/2014/main" id="{3A7C3BC1-C985-E043-A4ED-19AAC49039F6}"/>
+              </a:ext>
+            </a:extLst>
+          </p:cNvPr>
+          <p:cNvSpPr>
+            <a:spLocks noGrp="1"/>
+          </p:cNvSpPr>
+          <p:nvPr>
+            <p:ph idx="1"/>
+          </p:nvPr>
+        </p:nvSpPr>
+        <p:spPr/>
+        <p:txBody>
+          <a:bodyPr/>
+          <a:lstStyle/>
+          <a:p>
+            <a:r>
+              <a:rPr lang="en-US" dirty="0"/>
+              <a:t>Allows recording of testing a client/server interaction</a:t>
+            </a:r>
+          </a:p>
+          <a:p>
+            <a:pPr lvl="1"/>
+            <a:r>
+              <a:rPr lang="en-US" dirty="0"/>
+              <a:t>Especially useful for IG</a:t>
+            </a:r>
+          </a:p>
+          <a:p>
+            <a:r>
+              <a:rPr lang="en-US" dirty="0"/>
+              <a:t>A test is a client accessing a server – each in some specific role</a:t>
+            </a:r>
+          </a:p>
+          <a:p>
+            <a:r>
+              <a:rPr lang="en-US" dirty="0"/>
+              <a:t>2 parts:</a:t>
+            </a:r>
+          </a:p>
+          <a:p>
+            <a:pPr lvl="1"/>
+            <a:r>
+              <a:rPr lang="en-US" dirty="0"/>
+              <a:t>Recording a test result is from the ‘Track details &amp; testing’ tab</a:t>
+            </a:r>
+          </a:p>
+          <a:p>
+            <a:pPr lvl="1"/>
+            <a:r>
+              <a:rPr lang="en-US" dirty="0"/>
+              <a:t>All results in the ‘Test Results’ tab</a:t>
+            </a:r>
+          </a:p>
+          <a:p>
+            <a:r>
+              <a:rPr lang="en-US" dirty="0"/>
+              <a:t>Can also enter a general note against a scenario / IG</a:t>
+            </a:r>
+          </a:p>
+        </p:txBody>
+      </p:sp>
+    </p:spTree>
+    <p:extLst>
+      <p:ext uri="{BB962C8B-B14F-4D97-AF65-F5344CB8AC3E}">
+        <p14:creationId xmlns:p14="http://schemas.microsoft.com/office/powerpoint/2010/main" val="2101032508"/>
+      </p:ext>
+    </p:extLst>
+  </p:cSld>
+  <p:clrMapOvr>
+    <a:masterClrMapping/>
+  </p:clrMapOvr>
+</p:sld>
+</file>
+
+<file path=ppt/slides/slide3.xml><?xml version="1.0" encoding="utf-8"?>
+<p:sld xmlns:a="http://schemas.openxmlformats.org/drawingml/2006/main" xmlns:r="http://schemas.openxmlformats.org/officeDocument/2006/relationships" xmlns:p="http://schemas.openxmlformats.org/presentationml/2006/main">
+  <p:cSld>
+    <p:spTree>
+      <p:nvGrpSpPr>
+        <p:cNvPr id="1" name=""/>
+        <p:cNvGrpSpPr/>
+        <p:nvPr/>
+      </p:nvGrpSpPr>
+      <p:grpSpPr>
+        <a:xfrm>
+          <a:off x="0" y="0"/>
+          <a:ext cx="0" cy="0"/>
+          <a:chOff x="0" y="0"/>
+          <a:chExt cx="0" cy="0"/>
+        </a:xfrm>
+      </p:grpSpPr>
+      <p:sp>
+        <p:nvSpPr>
+          <p:cNvPr id="2" name="Title 1">
+            <a:extLst>
+              <a:ext uri="{FF2B5EF4-FFF2-40B4-BE49-F238E27FC236}">
+                <a16:creationId xmlns:a16="http://schemas.microsoft.com/office/drawing/2014/main" id="{86FE58F3-F75D-C945-8C5C-69C3343EB7D5}"/>
+              </a:ext>
+            </a:extLst>
+          </p:cNvPr>
+          <p:cNvSpPr>
+            <a:spLocks noGrp="1"/>
+          </p:cNvSpPr>
+          <p:nvPr>
+            <p:ph type="title"/>
+          </p:nvPr>
+        </p:nvSpPr>
+        <p:spPr/>
+        <p:txBody>
+          <a:bodyPr/>
+          <a:lstStyle/>
+          <a:p>
+            <a:r>
+              <a:rPr lang="en-US" dirty="0"/>
+              <a:t>Login &amp; User creation</a:t>
+            </a:r>
+          </a:p>
+        </p:txBody>
+      </p:sp>
+      <p:sp>
+        <p:nvSpPr>
+          <p:cNvPr id="3" name="Content Placeholder 2">
+            <a:extLst>
+              <a:ext uri="{FF2B5EF4-FFF2-40B4-BE49-F238E27FC236}">
+                <a16:creationId xmlns:a16="http://schemas.microsoft.com/office/drawing/2014/main" id="{F22829F0-8586-D64C-AF9D-A52C56332E25}"/>
+              </a:ext>
+            </a:extLst>
+          </p:cNvPr>
+          <p:cNvSpPr>
+            <a:spLocks noGrp="1"/>
+          </p:cNvSpPr>
+          <p:nvPr>
+            <p:ph idx="1"/>
+          </p:nvPr>
+        </p:nvSpPr>
+        <p:spPr/>
+        <p:txBody>
+          <a:bodyPr>
+            <a:normAutofit lnSpcReduction="10000"/>
+          </a:bodyPr>
+          <a:lstStyle/>
+          <a:p>
+            <a:r>
+              <a:rPr lang="en-US" dirty="0"/>
+              <a:t>Login is just name. No password required (at the moment)</a:t>
+            </a:r>
+          </a:p>
+          <a:p>
+            <a:r>
+              <a:rPr lang="en-US" dirty="0"/>
+              <a:t>When starting the app in a browser</a:t>
+            </a:r>
+          </a:p>
+          <a:p>
+            <a:pPr lvl="1"/>
+            <a:r>
+              <a:rPr lang="en-US" dirty="0"/>
+              <a:t>If this is the first time in the browser (or restarted), but the user has already been created:</a:t>
+            </a:r>
+          </a:p>
+          <a:p>
+            <a:pPr lvl="2"/>
+            <a:r>
+              <a:rPr lang="en-US" dirty="0"/>
+              <a:t>Type name in dialog – auto complete</a:t>
+            </a:r>
+          </a:p>
+          <a:p>
+            <a:pPr lvl="2"/>
+            <a:r>
+              <a:rPr lang="en-US" dirty="0"/>
+              <a:t>After selecting, user saved in browser and will be remembered</a:t>
+            </a:r>
+          </a:p>
+          <a:p>
+            <a:pPr lvl="1"/>
+            <a:r>
+              <a:rPr lang="en-US" dirty="0"/>
+              <a:t>If this user has not been created:</a:t>
+            </a:r>
+          </a:p>
+          <a:p>
+            <a:pPr lvl="2"/>
+            <a:r>
+              <a:rPr lang="en-US" dirty="0"/>
+              <a:t>Click ‘Register new Person’ in the dialog, then enter the user name</a:t>
+            </a:r>
+          </a:p>
+          <a:p>
+            <a:pPr lvl="2"/>
+            <a:r>
+              <a:rPr lang="en-US" dirty="0"/>
+              <a:t>Must be a unique name</a:t>
+            </a:r>
+          </a:p>
+          <a:p>
+            <a:pPr lvl="2"/>
+            <a:r>
+              <a:rPr lang="en-US" dirty="0"/>
+              <a:t>After selecting, user saved in browser and will be remembered</a:t>
+            </a:r>
+          </a:p>
+          <a:p>
+            <a:r>
+              <a:rPr lang="en-US" dirty="0"/>
+              <a:t>There is a logout option on the navbar</a:t>
+            </a:r>
+          </a:p>
+          <a:p>
+            <a:pPr lvl="1"/>
+            <a:r>
+              <a:rPr lang="en-US" dirty="0"/>
+              <a:t>Really only useful if someone else wishes to use the same browser</a:t>
+            </a:r>
+          </a:p>
+        </p:txBody>
+      </p:sp>
+    </p:spTree>
+    <p:extLst>
+      <p:ext uri="{BB962C8B-B14F-4D97-AF65-F5344CB8AC3E}">
+        <p14:creationId xmlns:p14="http://schemas.microsoft.com/office/powerpoint/2010/main" val="562579398"/>
+      </p:ext>
+    </p:extLst>
+  </p:cSld>
+  <p:clrMapOvr>
+    <a:masterClrMapping/>
+  </p:clrMapOvr>
+</p:sld>
+</file>
+
+<file path=ppt/slides/slide30.xml><?xml version="1.0" encoding="utf-8"?>
+<p:sld xmlns:a="http://schemas.openxmlformats.org/drawingml/2006/main" xmlns:r="http://schemas.openxmlformats.org/officeDocument/2006/relationships" xmlns:p="http://schemas.openxmlformats.org/presentationml/2006/main">
+  <p:cSld>
+    <p:spTree>
+      <p:nvGrpSpPr>
+        <p:cNvPr id="1" name=""/>
+        <p:cNvGrpSpPr/>
+        <p:nvPr/>
+      </p:nvGrpSpPr>
+      <p:grpSpPr>
+        <a:xfrm>
+          <a:off x="0" y="0"/>
+          <a:ext cx="0" cy="0"/>
+          <a:chOff x="0" y="0"/>
+          <a:chExt cx="0" cy="0"/>
+        </a:xfrm>
+      </p:grpSpPr>
+      <p:sp>
+        <p:nvSpPr>
+          <p:cNvPr id="2" name="Title 1">
+            <a:extLst>
+              <a:ext uri="{FF2B5EF4-FFF2-40B4-BE49-F238E27FC236}">
                 <a16:creationId xmlns:a16="http://schemas.microsoft.com/office/drawing/2014/main" id="{D0120E00-614A-F342-B22F-BD6D901E6F06}"/>
               </a:ext>
             </a:extLst>
@@ -5875,8 +6717,8 @@
         </p:nvSpPr>
         <p:spPr>
           <a:xfrm>
-            <a:off x="6561438" y="365125"/>
-            <a:ext cx="5177481" cy="936926"/>
+            <a:off x="333632" y="5704230"/>
+            <a:ext cx="11020168" cy="936926"/>
           </a:xfrm>
         </p:spPr>
         <p:txBody>
@@ -5885,8 +6727,13 @@
           <a:p>
             <a:r>
               <a:rPr lang="en-US" dirty="0"/>
-              <a:t>a</a:t>
-            </a:r>
+              <a:t>Existing results and new test under </a:t>
+            </a:r>
+            <a:r>
+              <a:rPr lang="en-US"/>
+              <a:t>track tab</a:t>
+            </a:r>
+            <a:endParaRPr lang="en-US" dirty="0"/>
           </a:p>
         </p:txBody>
       </p:sp>
@@ -5912,7 +6759,7 @@
         </p:blipFill>
         <p:spPr>
           <a:xfrm>
-            <a:off x="0" y="2064550"/>
+            <a:off x="0" y="1459069"/>
             <a:ext cx="12192000" cy="4088143"/>
           </a:xfrm>
           <a:prstGeom prst="rect">
@@ -5933,7 +6780,7 @@
 </p:sld>
 </file>
 
-<file path=ppt/slides/slide24.xml><?xml version="1.0" encoding="utf-8"?>
+<file path=ppt/slides/slide31.xml><?xml version="1.0" encoding="utf-8"?>
 <p:sld xmlns:a="http://schemas.openxmlformats.org/drawingml/2006/main" xmlns:r="http://schemas.openxmlformats.org/officeDocument/2006/relationships" xmlns:p="http://schemas.openxmlformats.org/presentationml/2006/main">
   <p:cSld>
     <p:spTree>
@@ -6250,7 +7097,7 @@
 </p:sld>
 </file>
 
-<file path=ppt/slides/slide25.xml><?xml version="1.0" encoding="utf-8"?>
+<file path=ppt/slides/slide32.xml><?xml version="1.0" encoding="utf-8"?>
 <p:sld xmlns:a="http://schemas.openxmlformats.org/drawingml/2006/main" xmlns:r="http://schemas.openxmlformats.org/officeDocument/2006/relationships" xmlns:p="http://schemas.openxmlformats.org/presentationml/2006/main">
   <p:cSld>
     <p:spTree>
@@ -6408,7 +7255,7 @@
           <a:p>
             <a:r>
               <a:rPr lang="en-US" dirty="0"/>
-              <a:t>Can indicate outcome: pass / Fail / Partial or just a note</a:t>
+              <a:t>Can indicate outcome: Pass / Fail / Partial or just a note</a:t>
             </a:r>
           </a:p>
           <a:p>
@@ -6419,36 +7266,6 @@
           </a:p>
         </p:txBody>
       </p:sp>
-      <p:pic>
-        <p:nvPicPr>
-          <p:cNvPr id="10" name="Picture 9">
-            <a:extLst>
-              <a:ext uri="{FF2B5EF4-FFF2-40B4-BE49-F238E27FC236}">
-                <a16:creationId xmlns:a16="http://schemas.microsoft.com/office/drawing/2014/main" id="{7B7FF1FD-9931-7144-A09D-98DFA5BBF050}"/>
-              </a:ext>
-            </a:extLst>
-          </p:cNvPr>
-          <p:cNvPicPr>
-            <a:picLocks noChangeAspect="1"/>
-          </p:cNvPicPr>
-          <p:nvPr/>
-        </p:nvPicPr>
-        <p:blipFill>
-          <a:blip r:embed="rId3"/>
-          <a:stretch>
-            <a:fillRect/>
-          </a:stretch>
-        </p:blipFill>
-        <p:spPr>
-          <a:xfrm>
-            <a:off x="6802566" y="261877"/>
-            <a:ext cx="5234302" cy="3774989"/>
-          </a:xfrm>
-          <a:prstGeom prst="rect">
-            <a:avLst/>
-          </a:prstGeom>
-        </p:spPr>
-      </p:pic>
       <p:sp>
         <p:nvSpPr>
           <p:cNvPr id="11" name="Content Placeholder 2">
@@ -6660,6 +7477,36 @@
           </a:p>
         </p:txBody>
       </p:sp>
+      <p:pic>
+        <p:nvPicPr>
+          <p:cNvPr id="13" name="Picture 12">
+            <a:extLst>
+              <a:ext uri="{FF2B5EF4-FFF2-40B4-BE49-F238E27FC236}">
+                <a16:creationId xmlns:a16="http://schemas.microsoft.com/office/drawing/2014/main" id="{F29FA19A-CBD0-1A4A-A69C-A44809400893}"/>
+              </a:ext>
+            </a:extLst>
+          </p:cNvPr>
+          <p:cNvPicPr>
+            <a:picLocks noChangeAspect="1"/>
+          </p:cNvPicPr>
+          <p:nvPr/>
+        </p:nvPicPr>
+        <p:blipFill>
+          <a:blip r:embed="rId3"/>
+          <a:stretch>
+            <a:fillRect/>
+          </a:stretch>
+        </p:blipFill>
+        <p:spPr>
+          <a:xfrm>
+            <a:off x="6802566" y="491572"/>
+            <a:ext cx="4986002" cy="3497643"/>
+          </a:xfrm>
+          <a:prstGeom prst="rect">
+            <a:avLst/>
+          </a:prstGeom>
+        </p:spPr>
+      </p:pic>
     </p:spTree>
     <p:extLst>
       <p:ext uri="{BB962C8B-B14F-4D97-AF65-F5344CB8AC3E}">
@@ -6731,7 +7578,7 @@
                                           </p:stCondLst>
                                         </p:cTn>
                                         <p:tgtEl>
-                                          <p:spTgt spid="10"/>
+                                          <p:spTgt spid="13"/>
                                         </p:tgtEl>
                                         <p:attrNameLst>
                                           <p:attrName>style.visibility</p:attrName>
@@ -6778,7 +7625,7 @@
 </p:sld>
 </file>
 
-<file path=ppt/slides/slide26.xml><?xml version="1.0" encoding="utf-8"?>
+<file path=ppt/slides/slide33.xml><?xml version="1.0" encoding="utf-8"?>
 <p:sld xmlns:a="http://schemas.openxmlformats.org/drawingml/2006/main" xmlns:r="http://schemas.openxmlformats.org/officeDocument/2006/relationships" xmlns:p="http://schemas.openxmlformats.org/presentationml/2006/main">
   <p:cSld>
     <p:spTree>
@@ -6907,7 +7754,7 @@
 </p:sld>
 </file>
 
-<file path=ppt/slides/slide3.xml><?xml version="1.0" encoding="utf-8"?>
+<file path=ppt/slides/slide34.xml><?xml version="1.0" encoding="utf-8"?>
 <p:sld xmlns:a="http://schemas.openxmlformats.org/drawingml/2006/main" xmlns:r="http://schemas.openxmlformats.org/officeDocument/2006/relationships" xmlns:p="http://schemas.openxmlformats.org/presentationml/2006/main">
   <p:cSld>
     <p:spTree>
@@ -6929,7 +7776,7 @@
           <p:cNvPr id="2" name="Title 1">
             <a:extLst>
               <a:ext uri="{FF2B5EF4-FFF2-40B4-BE49-F238E27FC236}">
-                <a16:creationId xmlns:a16="http://schemas.microsoft.com/office/drawing/2014/main" id="{86FE58F3-F75D-C945-8C5C-69C3343EB7D5}"/>
+                <a16:creationId xmlns:a16="http://schemas.microsoft.com/office/drawing/2014/main" id="{69C115C8-D53E-C54D-A5E8-AB1D720D6B0D}"/>
               </a:ext>
             </a:extLst>
           </p:cNvPr>
@@ -6947,17 +7794,47 @@
           <a:p>
             <a:r>
               <a:rPr lang="en-US" dirty="0"/>
-              <a:t>Login &amp; User creation</a:t>
-            </a:r>
-          </a:p>
-        </p:txBody>
-      </p:sp>
+              <a:t>Report by IG</a:t>
+            </a:r>
+          </a:p>
+        </p:txBody>
+      </p:sp>
+      <p:pic>
+        <p:nvPicPr>
+          <p:cNvPr id="5" name="Picture 4">
+            <a:extLst>
+              <a:ext uri="{FF2B5EF4-FFF2-40B4-BE49-F238E27FC236}">
+                <a16:creationId xmlns:a16="http://schemas.microsoft.com/office/drawing/2014/main" id="{D8552209-B19F-4B4F-A0D6-3480802436DB}"/>
+              </a:ext>
+            </a:extLst>
+          </p:cNvPr>
+          <p:cNvPicPr>
+            <a:picLocks noChangeAspect="1"/>
+          </p:cNvPicPr>
+          <p:nvPr/>
+        </p:nvPicPr>
+        <p:blipFill>
+          <a:blip r:embed="rId2"/>
+          <a:stretch>
+            <a:fillRect/>
+          </a:stretch>
+        </p:blipFill>
+        <p:spPr>
+          <a:xfrm>
+            <a:off x="115330" y="1487574"/>
+            <a:ext cx="12192000" cy="3784000"/>
+          </a:xfrm>
+          <a:prstGeom prst="rect">
+            <a:avLst/>
+          </a:prstGeom>
+        </p:spPr>
+      </p:pic>
       <p:sp>
         <p:nvSpPr>
           <p:cNvPr id="3" name="Content Placeholder 2">
             <a:extLst>
               <a:ext uri="{FF2B5EF4-FFF2-40B4-BE49-F238E27FC236}">
-                <a16:creationId xmlns:a16="http://schemas.microsoft.com/office/drawing/2014/main" id="{F22829F0-8586-D64C-AF9D-A52C56332E25}"/>
+                <a16:creationId xmlns:a16="http://schemas.microsoft.com/office/drawing/2014/main" id="{0DBAEC69-1856-6D46-B584-7A86FE36162A}"/>
               </a:ext>
             </a:extLst>
           </p:cNvPr>
@@ -6968,92 +7845,37 @@
             <p:ph idx="1"/>
           </p:nvPr>
         </p:nvSpPr>
-        <p:spPr/>
-        <p:txBody>
-          <a:bodyPr>
-            <a:normAutofit lnSpcReduction="10000"/>
-          </a:bodyPr>
-          <a:lstStyle/>
-          <a:p>
-            <a:r>
-              <a:rPr lang="en-US" dirty="0"/>
-              <a:t>Login is just name. No password required (at the moment)</a:t>
-            </a:r>
-          </a:p>
-          <a:p>
-            <a:r>
-              <a:rPr lang="en-US" dirty="0"/>
-              <a:t>When starting the app in a browser</a:t>
+        <p:spPr>
+          <a:xfrm>
+            <a:off x="115330" y="5271574"/>
+            <a:ext cx="11580341" cy="1469039"/>
+          </a:xfrm>
+        </p:spPr>
+        <p:txBody>
+          <a:bodyPr/>
+          <a:lstStyle/>
+          <a:p>
+            <a:r>
+              <a:rPr lang="en-US" dirty="0"/>
+              <a:t>When a test is associated with an IG</a:t>
             </a:r>
           </a:p>
           <a:p>
             <a:pPr lvl="1"/>
             <a:r>
               <a:rPr lang="en-US" dirty="0"/>
-              <a:t>If this is the first time in the browser, but the user has already been created</a:t>
-            </a:r>
-          </a:p>
-          <a:p>
-            <a:pPr lvl="2"/>
-            <a:r>
-              <a:rPr lang="en-US" dirty="0"/>
-              <a:t>Type name in dialog – auto complete</a:t>
-            </a:r>
-          </a:p>
-          <a:p>
-            <a:pPr lvl="2"/>
-            <a:r>
-              <a:rPr lang="en-US" dirty="0"/>
-              <a:t>After selecting, user saved in browser and will be remembered</a:t>
-            </a:r>
-          </a:p>
-          <a:p>
-            <a:pPr lvl="1"/>
-            <a:r>
-              <a:rPr lang="en-US" dirty="0"/>
-              <a:t>If this user has not been created</a:t>
-            </a:r>
-          </a:p>
-          <a:p>
-            <a:pPr lvl="2"/>
-            <a:r>
-              <a:rPr lang="en-US" dirty="0"/>
-              <a:t>Click ‘Register new Person’ in the dialog, then enter the user name</a:t>
-            </a:r>
-          </a:p>
-          <a:p>
-            <a:pPr lvl="2"/>
-            <a:r>
-              <a:rPr lang="en-US" dirty="0"/>
-              <a:t>Must be a unique name</a:t>
-            </a:r>
-          </a:p>
-          <a:p>
-            <a:pPr lvl="2"/>
-            <a:r>
-              <a:rPr lang="en-US" dirty="0"/>
-              <a:t>After selecting, user saved in browser and will be remembered</a:t>
-            </a:r>
-          </a:p>
-          <a:p>
-            <a:r>
-              <a:rPr lang="en-US" dirty="0"/>
-              <a:t>There is a logout option on the navbar</a:t>
-            </a:r>
-          </a:p>
-          <a:p>
-            <a:pPr lvl="1"/>
-            <a:r>
-              <a:rPr lang="en-US" dirty="0"/>
-              <a:t>Really only useful if someone else wishes to use the same browser</a:t>
-            </a:r>
+              <a:t>IGs registered against track </a:t>
+            </a:r>
+          </a:p>
+          <a:p>
+            <a:endParaRPr lang="en-US" dirty="0"/>
           </a:p>
         </p:txBody>
       </p:sp>
     </p:spTree>
     <p:extLst>
       <p:ext uri="{BB962C8B-B14F-4D97-AF65-F5344CB8AC3E}">
-        <p14:creationId xmlns:p14="http://schemas.microsoft.com/office/powerpoint/2010/main" val="562579398"/>
+        <p14:creationId xmlns:p14="http://schemas.microsoft.com/office/powerpoint/2010/main" val="3883122878"/>
       </p:ext>
     </p:extLst>
   </p:cSld>
@@ -7228,6 +8050,26 @@
           <a:p>
             <a:r>
               <a:rPr lang="en-US" dirty="0"/>
+              <a:t>Specifically to enable</a:t>
+            </a:r>
+          </a:p>
+          <a:p>
+            <a:pPr lvl="1"/>
+            <a:r>
+              <a:rPr lang="en-US" dirty="0"/>
+              <a:t>Easy way to find stuff</a:t>
+            </a:r>
+          </a:p>
+          <a:p>
+            <a:pPr lvl="1"/>
+            <a:r>
+              <a:rPr lang="en-US" dirty="0"/>
+              <a:t>Enter tests / comments against an IG</a:t>
+            </a:r>
+          </a:p>
+          <a:p>
+            <a:r>
+              <a:rPr lang="en-US" dirty="0"/>
               <a:t>One off task before event (though can edit at any time)</a:t>
             </a:r>
           </a:p>
@@ -7308,8 +8150,8 @@
         </p:nvSpPr>
         <p:spPr>
           <a:xfrm>
-            <a:off x="1959429" y="2275114"/>
-            <a:ext cx="1295400" cy="1600200"/>
+            <a:off x="2737911" y="2102116"/>
+            <a:ext cx="1692727" cy="1600200"/>
           </a:xfrm>
           <a:prstGeom prst="roundRect">
             <a:avLst/>
@@ -7357,7 +8199,7 @@
         </p:nvSpPr>
         <p:spPr>
           <a:xfrm>
-            <a:off x="5301342" y="1959429"/>
+            <a:off x="5807974" y="1786431"/>
             <a:ext cx="2090057" cy="762000"/>
           </a:xfrm>
           <a:prstGeom prst="roundRect">
@@ -7406,7 +8248,7 @@
         </p:nvSpPr>
         <p:spPr>
           <a:xfrm>
-            <a:off x="5301342" y="3494314"/>
+            <a:off x="5807974" y="3321316"/>
             <a:ext cx="2090057" cy="762000"/>
           </a:xfrm>
           <a:prstGeom prst="roundRect">
@@ -7457,7 +8299,7 @@
         </p:nvCxnSpPr>
         <p:spPr>
           <a:xfrm flipV="1">
-            <a:off x="3254829" y="2340429"/>
+            <a:off x="3761461" y="2167431"/>
             <a:ext cx="2046513" cy="734785"/>
           </a:xfrm>
           <a:prstGeom prst="bentConnector3">
@@ -7498,7 +8340,7 @@
         </p:nvCxnSpPr>
         <p:spPr>
           <a:xfrm>
-            <a:off x="3254829" y="3075214"/>
+            <a:off x="3761461" y="2902216"/>
             <a:ext cx="2046513" cy="800100"/>
           </a:xfrm>
           <a:prstGeom prst="bentConnector3">
@@ -7537,7 +8379,7 @@
         </p:nvSpPr>
         <p:spPr>
           <a:xfrm>
-            <a:off x="4684388" y="3475264"/>
+            <a:off x="5191020" y="3302266"/>
             <a:ext cx="532518" cy="369332"/>
           </a:xfrm>
           <a:prstGeom prst="rect">
@@ -7572,7 +8414,7 @@
         </p:nvSpPr>
         <p:spPr>
           <a:xfrm>
-            <a:off x="4684388" y="2008138"/>
+            <a:off x="5191020" y="1835140"/>
             <a:ext cx="532518" cy="369332"/>
           </a:xfrm>
           <a:prstGeom prst="rect">
@@ -7607,8 +8449,8 @@
         </p:nvSpPr>
         <p:spPr>
           <a:xfrm>
-            <a:off x="1099752" y="4207605"/>
-            <a:ext cx="2585836" cy="923330"/>
+            <a:off x="69673" y="2369885"/>
+            <a:ext cx="2747668" cy="1200329"/>
           </a:xfrm>
           <a:prstGeom prst="rect">
             <a:avLst/>
@@ -7616,7 +8458,7 @@
           <a:noFill/>
         </p:spPr>
         <p:txBody>
-          <a:bodyPr wrap="none" rtlCol="0">
+          <a:bodyPr wrap="square" rtlCol="0">
             <a:spAutoFit/>
           </a:bodyPr>
           <a:lstStyle/>
@@ -7629,6 +8471,12 @@
           <a:p>
             <a:r>
               <a:rPr lang="en-US" dirty="0"/>
+              <a:t>Type</a:t>
+            </a:r>
+          </a:p>
+          <a:p>
+            <a:r>
+              <a:rPr lang="en-US" dirty="0"/>
               <a:t>Track Lead</a:t>
             </a:r>
           </a:p>
@@ -7654,7 +8502,7 @@
         </p:nvSpPr>
         <p:spPr>
           <a:xfrm>
-            <a:off x="8167816" y="1756003"/>
+            <a:off x="8316100" y="1583005"/>
             <a:ext cx="3598421" cy="923330"/>
           </a:xfrm>
           <a:prstGeom prst="rect">
@@ -7701,7 +8549,7 @@
         </p:nvSpPr>
         <p:spPr>
           <a:xfrm>
-            <a:off x="8303741" y="3659930"/>
+            <a:off x="8452025" y="3153296"/>
             <a:ext cx="3093924" cy="923330"/>
           </a:xfrm>
           <a:prstGeom prst="rect">
@@ -7748,7 +8596,7 @@
         </p:nvSpPr>
         <p:spPr>
           <a:xfrm>
-            <a:off x="9279924" y="4669270"/>
+            <a:off x="9428208" y="4162636"/>
             <a:ext cx="2298357" cy="664384"/>
           </a:xfrm>
           <a:prstGeom prst="rect">
@@ -7765,6 +8613,509 @@
             <a:r>
               <a:rPr lang="en-US" i="1" dirty="0"/>
               <a:t>Must have scenarios if recording testing</a:t>
+            </a:r>
+          </a:p>
+        </p:txBody>
+      </p:sp>
+      <p:sp>
+        <p:nvSpPr>
+          <p:cNvPr id="18" name="Rounded Rectangle 17">
+            <a:extLst>
+              <a:ext uri="{FF2B5EF4-FFF2-40B4-BE49-F238E27FC236}">
+                <a16:creationId xmlns:a16="http://schemas.microsoft.com/office/drawing/2014/main" id="{3D83C7E3-CD1B-3B4B-BC65-4D6656514730}"/>
+              </a:ext>
+            </a:extLst>
+          </p:cNvPr>
+          <p:cNvSpPr/>
+          <p:nvPr/>
+        </p:nvSpPr>
+        <p:spPr>
+          <a:xfrm>
+            <a:off x="5807974" y="5160656"/>
+            <a:ext cx="2090057" cy="762000"/>
+          </a:xfrm>
+          <a:prstGeom prst="roundRect">
+            <a:avLst/>
+          </a:prstGeom>
+        </p:spPr>
+        <p:style>
+          <a:lnRef idx="2">
+            <a:schemeClr val="accent1">
+              <a:shade val="50000"/>
+            </a:schemeClr>
+          </a:lnRef>
+          <a:fillRef idx="1">
+            <a:schemeClr val="accent1"/>
+          </a:fillRef>
+          <a:effectRef idx="0">
+            <a:schemeClr val="accent1"/>
+          </a:effectRef>
+          <a:fontRef idx="minor">
+            <a:schemeClr val="lt1"/>
+          </a:fontRef>
+        </p:style>
+        <p:txBody>
+          <a:bodyPr rtlCol="0" anchor="ctr"/>
+          <a:lstStyle/>
+          <a:p>
+            <a:pPr algn="ctr"/>
+            <a:r>
+              <a:rPr lang="en-US" dirty="0"/>
+              <a:t>Test</a:t>
+            </a:r>
+          </a:p>
+        </p:txBody>
+      </p:sp>
+      <p:cxnSp>
+        <p:nvCxnSpPr>
+          <p:cNvPr id="20" name="Straight Arrow Connector 19">
+            <a:extLst>
+              <a:ext uri="{FF2B5EF4-FFF2-40B4-BE49-F238E27FC236}">
+                <a16:creationId xmlns:a16="http://schemas.microsoft.com/office/drawing/2014/main" id="{BEAEFC2A-1BFC-D943-AF33-883EDEE184B7}"/>
+              </a:ext>
+            </a:extLst>
+          </p:cNvPr>
+          <p:cNvCxnSpPr>
+            <a:stCxn id="18" idx="0"/>
+            <a:endCxn id="7" idx="2"/>
+          </p:cNvCxnSpPr>
+          <p:nvPr/>
+        </p:nvCxnSpPr>
+        <p:spPr>
+          <a:xfrm flipV="1">
+            <a:off x="6853003" y="4083316"/>
+            <a:ext cx="0" cy="1077340"/>
+          </a:xfrm>
+          <a:prstGeom prst="straightConnector1">
+            <a:avLst/>
+          </a:prstGeom>
+          <a:ln>
+            <a:tailEnd type="triangle"/>
+          </a:ln>
+        </p:spPr>
+        <p:style>
+          <a:lnRef idx="1">
+            <a:schemeClr val="accent1"/>
+          </a:lnRef>
+          <a:fillRef idx="0">
+            <a:schemeClr val="accent1"/>
+          </a:fillRef>
+          <a:effectRef idx="0">
+            <a:schemeClr val="accent1"/>
+          </a:effectRef>
+          <a:fontRef idx="minor">
+            <a:schemeClr val="tx1"/>
+          </a:fontRef>
+        </p:style>
+      </p:cxnSp>
+      <p:sp>
+        <p:nvSpPr>
+          <p:cNvPr id="21" name="TextBox 20">
+            <a:extLst>
+              <a:ext uri="{FF2B5EF4-FFF2-40B4-BE49-F238E27FC236}">
+                <a16:creationId xmlns:a16="http://schemas.microsoft.com/office/drawing/2014/main" id="{68C1B648-9624-2D4D-9A15-141A94BC6573}"/>
+              </a:ext>
+            </a:extLst>
+          </p:cNvPr>
+          <p:cNvSpPr txBox="1"/>
+          <p:nvPr/>
+        </p:nvSpPr>
+        <p:spPr>
+          <a:xfrm>
+            <a:off x="6236431" y="4791324"/>
+            <a:ext cx="534121" cy="369332"/>
+          </a:xfrm>
+          <a:prstGeom prst="rect">
+            <a:avLst/>
+          </a:prstGeom>
+          <a:noFill/>
+        </p:spPr>
+        <p:txBody>
+          <a:bodyPr wrap="none" rtlCol="0">
+            <a:spAutoFit/>
+          </a:bodyPr>
+          <a:lstStyle/>
+          <a:p>
+            <a:r>
+              <a:rPr lang="en-US" dirty="0"/>
+              <a:t>1..1</a:t>
+            </a:r>
+          </a:p>
+        </p:txBody>
+      </p:sp>
+      <p:sp>
+        <p:nvSpPr>
+          <p:cNvPr id="22" name="TextBox 21">
+            <a:extLst>
+              <a:ext uri="{FF2B5EF4-FFF2-40B4-BE49-F238E27FC236}">
+                <a16:creationId xmlns:a16="http://schemas.microsoft.com/office/drawing/2014/main" id="{7485D6C3-1716-5F46-958F-E7937BA19D18}"/>
+              </a:ext>
+            </a:extLst>
+          </p:cNvPr>
+          <p:cNvSpPr txBox="1"/>
+          <p:nvPr/>
+        </p:nvSpPr>
+        <p:spPr>
+          <a:xfrm>
+            <a:off x="8489095" y="5160656"/>
+            <a:ext cx="3572453" cy="923330"/>
+          </a:xfrm>
+          <a:prstGeom prst="rect">
+            <a:avLst/>
+          </a:prstGeom>
+          <a:noFill/>
+        </p:spPr>
+        <p:txBody>
+          <a:bodyPr wrap="none" rtlCol="0">
+            <a:spAutoFit/>
+          </a:bodyPr>
+          <a:lstStyle/>
+          <a:p>
+            <a:r>
+              <a:rPr lang="en-US" dirty="0"/>
+              <a:t>Result of testing a server interaction</a:t>
+            </a:r>
+          </a:p>
+          <a:p>
+            <a:r>
+              <a:rPr lang="en-US" dirty="0"/>
+              <a:t>Generally a client &amp; server in roles</a:t>
+            </a:r>
+          </a:p>
+          <a:p>
+            <a:r>
+              <a:rPr lang="en-US" dirty="0"/>
+              <a:t>Can just be a note</a:t>
+            </a:r>
+          </a:p>
+        </p:txBody>
+      </p:sp>
+      <p:sp>
+        <p:nvSpPr>
+          <p:cNvPr id="23" name="Rounded Rectangle 22">
+            <a:extLst>
+              <a:ext uri="{FF2B5EF4-FFF2-40B4-BE49-F238E27FC236}">
+                <a16:creationId xmlns:a16="http://schemas.microsoft.com/office/drawing/2014/main" id="{797E9BF2-2071-6C47-8C35-7CD88CFD3C4F}"/>
+              </a:ext>
+            </a:extLst>
+          </p:cNvPr>
+          <p:cNvSpPr/>
+          <p:nvPr/>
+        </p:nvSpPr>
+        <p:spPr>
+          <a:xfrm>
+            <a:off x="2737912" y="4691033"/>
+            <a:ext cx="1692728" cy="762000"/>
+          </a:xfrm>
+          <a:prstGeom prst="roundRect">
+            <a:avLst/>
+          </a:prstGeom>
+          <a:solidFill>
+            <a:srgbClr val="FF0000"/>
+          </a:solidFill>
+        </p:spPr>
+        <p:style>
+          <a:lnRef idx="2">
+            <a:schemeClr val="accent1">
+              <a:shade val="50000"/>
+            </a:schemeClr>
+          </a:lnRef>
+          <a:fillRef idx="1">
+            <a:schemeClr val="accent1"/>
+          </a:fillRef>
+          <a:effectRef idx="0">
+            <a:schemeClr val="accent1"/>
+          </a:effectRef>
+          <a:fontRef idx="minor">
+            <a:schemeClr val="lt1"/>
+          </a:fontRef>
+        </p:style>
+        <p:txBody>
+          <a:bodyPr rtlCol="0" anchor="ctr"/>
+          <a:lstStyle/>
+          <a:p>
+            <a:pPr algn="ctr"/>
+            <a:r>
+              <a:rPr lang="en-US" dirty="0"/>
+              <a:t>Server</a:t>
+            </a:r>
+          </a:p>
+        </p:txBody>
+      </p:sp>
+      <p:sp>
+        <p:nvSpPr>
+          <p:cNvPr id="24" name="Rounded Rectangle 23">
+            <a:extLst>
+              <a:ext uri="{FF2B5EF4-FFF2-40B4-BE49-F238E27FC236}">
+                <a16:creationId xmlns:a16="http://schemas.microsoft.com/office/drawing/2014/main" id="{E0332476-4ED4-6E46-ADFE-0B577E84F82C}"/>
+              </a:ext>
+            </a:extLst>
+          </p:cNvPr>
+          <p:cNvSpPr/>
+          <p:nvPr/>
+        </p:nvSpPr>
+        <p:spPr>
+          <a:xfrm>
+            <a:off x="2737912" y="5702986"/>
+            <a:ext cx="1692728" cy="762000"/>
+          </a:xfrm>
+          <a:prstGeom prst="roundRect">
+            <a:avLst/>
+          </a:prstGeom>
+          <a:solidFill>
+            <a:srgbClr val="00B050"/>
+          </a:solidFill>
+        </p:spPr>
+        <p:style>
+          <a:lnRef idx="2">
+            <a:schemeClr val="accent1">
+              <a:shade val="50000"/>
+            </a:schemeClr>
+          </a:lnRef>
+          <a:fillRef idx="1">
+            <a:schemeClr val="accent1"/>
+          </a:fillRef>
+          <a:effectRef idx="0">
+            <a:schemeClr val="accent1"/>
+          </a:effectRef>
+          <a:fontRef idx="minor">
+            <a:schemeClr val="lt1"/>
+          </a:fontRef>
+        </p:style>
+        <p:txBody>
+          <a:bodyPr rtlCol="0" anchor="ctr"/>
+          <a:lstStyle/>
+          <a:p>
+            <a:pPr algn="ctr"/>
+            <a:r>
+              <a:rPr lang="en-US" dirty="0"/>
+              <a:t>Client</a:t>
+            </a:r>
+          </a:p>
+        </p:txBody>
+      </p:sp>
+      <p:cxnSp>
+        <p:nvCxnSpPr>
+          <p:cNvPr id="26" name="Elbow Connector 25">
+            <a:extLst>
+              <a:ext uri="{FF2B5EF4-FFF2-40B4-BE49-F238E27FC236}">
+                <a16:creationId xmlns:a16="http://schemas.microsoft.com/office/drawing/2014/main" id="{625573B9-BB4F-F545-96EC-00A6DC46F3F4}"/>
+              </a:ext>
+            </a:extLst>
+          </p:cNvPr>
+          <p:cNvCxnSpPr>
+            <a:cxnSpLocks/>
+            <a:stCxn id="18" idx="1"/>
+            <a:endCxn id="23" idx="3"/>
+          </p:cNvCxnSpPr>
+          <p:nvPr/>
+        </p:nvCxnSpPr>
+        <p:spPr>
+          <a:xfrm rot="10800000">
+            <a:off x="4430640" y="5072034"/>
+            <a:ext cx="1377334" cy="469623"/>
+          </a:xfrm>
+          <a:prstGeom prst="bentConnector3">
+            <a:avLst/>
+          </a:prstGeom>
+          <a:ln>
+            <a:tailEnd type="triangle"/>
+          </a:ln>
+        </p:spPr>
+        <p:style>
+          <a:lnRef idx="1">
+            <a:schemeClr val="accent1"/>
+          </a:lnRef>
+          <a:fillRef idx="0">
+            <a:schemeClr val="accent1"/>
+          </a:fillRef>
+          <a:effectRef idx="0">
+            <a:schemeClr val="accent1"/>
+          </a:effectRef>
+          <a:fontRef idx="minor">
+            <a:schemeClr val="tx1"/>
+          </a:fontRef>
+        </p:style>
+      </p:cxnSp>
+      <p:cxnSp>
+        <p:nvCxnSpPr>
+          <p:cNvPr id="27" name="Elbow Connector 26">
+            <a:extLst>
+              <a:ext uri="{FF2B5EF4-FFF2-40B4-BE49-F238E27FC236}">
+                <a16:creationId xmlns:a16="http://schemas.microsoft.com/office/drawing/2014/main" id="{402B04CC-C5F2-7C40-9A78-8E546B49B0C7}"/>
+              </a:ext>
+            </a:extLst>
+          </p:cNvPr>
+          <p:cNvCxnSpPr>
+            <a:cxnSpLocks/>
+            <a:stCxn id="18" idx="1"/>
+            <a:endCxn id="24" idx="3"/>
+          </p:cNvCxnSpPr>
+          <p:nvPr/>
+        </p:nvCxnSpPr>
+        <p:spPr>
+          <a:xfrm rot="10800000" flipV="1">
+            <a:off x="4430640" y="5541656"/>
+            <a:ext cx="1377334" cy="542330"/>
+          </a:xfrm>
+          <a:prstGeom prst="bentConnector3">
+            <a:avLst/>
+          </a:prstGeom>
+          <a:ln>
+            <a:tailEnd type="triangle"/>
+          </a:ln>
+        </p:spPr>
+        <p:style>
+          <a:lnRef idx="1">
+            <a:schemeClr val="accent1"/>
+          </a:lnRef>
+          <a:fillRef idx="0">
+            <a:schemeClr val="accent1"/>
+          </a:fillRef>
+          <a:effectRef idx="0">
+            <a:schemeClr val="accent1"/>
+          </a:effectRef>
+          <a:fontRef idx="minor">
+            <a:schemeClr val="tx1"/>
+          </a:fontRef>
+        </p:style>
+      </p:cxnSp>
+      <p:sp>
+        <p:nvSpPr>
+          <p:cNvPr id="32" name="TextBox 31">
+            <a:extLst>
+              <a:ext uri="{FF2B5EF4-FFF2-40B4-BE49-F238E27FC236}">
+                <a16:creationId xmlns:a16="http://schemas.microsoft.com/office/drawing/2014/main" id="{8CC0FA79-7967-F64F-861A-C87588A43AA8}"/>
+              </a:ext>
+            </a:extLst>
+          </p:cNvPr>
+          <p:cNvSpPr txBox="1"/>
+          <p:nvPr/>
+        </p:nvSpPr>
+        <p:spPr>
+          <a:xfrm>
+            <a:off x="444843" y="4827020"/>
+            <a:ext cx="1441292" cy="369332"/>
+          </a:xfrm>
+          <a:prstGeom prst="rect">
+            <a:avLst/>
+          </a:prstGeom>
+          <a:noFill/>
+        </p:spPr>
+        <p:txBody>
+          <a:bodyPr wrap="none" rtlCol="0">
+            <a:spAutoFit/>
+          </a:bodyPr>
+          <a:lstStyle/>
+          <a:p>
+            <a:r>
+              <a:rPr lang="en-US" dirty="0"/>
+              <a:t>A FHIR server</a:t>
+            </a:r>
+          </a:p>
+        </p:txBody>
+      </p:sp>
+      <p:sp>
+        <p:nvSpPr>
+          <p:cNvPr id="33" name="TextBox 32">
+            <a:extLst>
+              <a:ext uri="{FF2B5EF4-FFF2-40B4-BE49-F238E27FC236}">
+                <a16:creationId xmlns:a16="http://schemas.microsoft.com/office/drawing/2014/main" id="{02909BFE-F4F7-C84E-A8AA-9C71D86D1B48}"/>
+              </a:ext>
+            </a:extLst>
+          </p:cNvPr>
+          <p:cNvSpPr txBox="1"/>
+          <p:nvPr/>
+        </p:nvSpPr>
+        <p:spPr>
+          <a:xfrm>
+            <a:off x="444843" y="5926429"/>
+            <a:ext cx="1371979" cy="369332"/>
+          </a:xfrm>
+          <a:prstGeom prst="rect">
+            <a:avLst/>
+          </a:prstGeom>
+          <a:noFill/>
+        </p:spPr>
+        <p:txBody>
+          <a:bodyPr wrap="none" rtlCol="0">
+            <a:spAutoFit/>
+          </a:bodyPr>
+          <a:lstStyle/>
+          <a:p>
+            <a:r>
+              <a:rPr lang="en-US" dirty="0"/>
+              <a:t>A FHIR client</a:t>
+            </a:r>
+          </a:p>
+        </p:txBody>
+      </p:sp>
+      <p:sp>
+        <p:nvSpPr>
+          <p:cNvPr id="34" name="TextBox 33">
+            <a:extLst>
+              <a:ext uri="{FF2B5EF4-FFF2-40B4-BE49-F238E27FC236}">
+                <a16:creationId xmlns:a16="http://schemas.microsoft.com/office/drawing/2014/main" id="{7162921A-A9B9-C04F-8579-D71194093DE1}"/>
+              </a:ext>
+            </a:extLst>
+          </p:cNvPr>
+          <p:cNvSpPr txBox="1"/>
+          <p:nvPr/>
+        </p:nvSpPr>
+        <p:spPr>
+          <a:xfrm>
+            <a:off x="4512434" y="4658391"/>
+            <a:ext cx="534121" cy="369332"/>
+          </a:xfrm>
+          <a:prstGeom prst="rect">
+            <a:avLst/>
+          </a:prstGeom>
+          <a:noFill/>
+        </p:spPr>
+        <p:txBody>
+          <a:bodyPr wrap="none" rtlCol="0">
+            <a:spAutoFit/>
+          </a:bodyPr>
+          <a:lstStyle/>
+          <a:p>
+            <a:r>
+              <a:rPr lang="en-US" dirty="0"/>
+              <a:t>0..1</a:t>
+            </a:r>
+          </a:p>
+        </p:txBody>
+      </p:sp>
+      <p:sp>
+        <p:nvSpPr>
+          <p:cNvPr id="35" name="TextBox 34">
+            <a:extLst>
+              <a:ext uri="{FF2B5EF4-FFF2-40B4-BE49-F238E27FC236}">
+                <a16:creationId xmlns:a16="http://schemas.microsoft.com/office/drawing/2014/main" id="{58E2C8C4-72EA-1F4D-B914-B1F8EFF500C0}"/>
+              </a:ext>
+            </a:extLst>
+          </p:cNvPr>
+          <p:cNvSpPr txBox="1"/>
+          <p:nvPr/>
+        </p:nvSpPr>
+        <p:spPr>
+          <a:xfrm>
+            <a:off x="4578335" y="5712841"/>
+            <a:ext cx="534121" cy="369332"/>
+          </a:xfrm>
+          <a:prstGeom prst="rect">
+            <a:avLst/>
+          </a:prstGeom>
+          <a:noFill/>
+        </p:spPr>
+        <p:txBody>
+          <a:bodyPr wrap="none" rtlCol="0">
+            <a:spAutoFit/>
+          </a:bodyPr>
+          <a:lstStyle/>
+          <a:p>
+            <a:r>
+              <a:rPr lang="en-US" dirty="0"/>
+              <a:t>0..1</a:t>
             </a:r>
           </a:p>
         </p:txBody>
@@ -7888,6 +9239,34 @@
             </a:r>
           </a:p>
           <a:p>
+            <a:pPr lvl="2"/>
+            <a:r>
+              <a:rPr lang="en-US" dirty="0"/>
+              <a:t>Track Lead</a:t>
+            </a:r>
+          </a:p>
+          <a:p>
+            <a:pPr lvl="2"/>
+            <a:r>
+              <a:rPr lang="en-US" dirty="0"/>
+              <a:t>Description</a:t>
+            </a:r>
+          </a:p>
+          <a:p>
+            <a:pPr lvl="2"/>
+            <a:r>
+              <a:rPr lang="en-US" dirty="0"/>
+              <a:t>IGs</a:t>
+            </a:r>
+          </a:p>
+          <a:p>
+            <a:pPr lvl="2"/>
+            <a:r>
+              <a:rPr lang="en-US" dirty="0"/>
+              <a:t>Links to confluence / FHIR registry</a:t>
+            </a:r>
+          </a:p>
+          <a:p>
             <a:pPr marL="914400" lvl="1" indent="-457200">
               <a:buFont typeface="+mj-lt"/>
               <a:buAutoNum type="arabicPeriod"/>
@@ -7895,6 +9274,13 @@
             <a:r>
               <a:rPr lang="en-US" dirty="0"/>
               <a:t>Add the scenarios</a:t>
+            </a:r>
+          </a:p>
+          <a:p>
+            <a:pPr lvl="2"/>
+            <a:r>
+              <a:rPr lang="en-US" dirty="0"/>
+              <a:t>Basis of testing</a:t>
             </a:r>
           </a:p>
           <a:p>
@@ -7936,6 +9322,89 @@
           <a:chExt cx="0" cy="0"/>
         </a:xfrm>
       </p:grpSpPr>
+      <p:sp>
+        <p:nvSpPr>
+          <p:cNvPr id="4" name="Title 3">
+            <a:extLst>
+              <a:ext uri="{FF2B5EF4-FFF2-40B4-BE49-F238E27FC236}">
+                <a16:creationId xmlns:a16="http://schemas.microsoft.com/office/drawing/2014/main" id="{005D637A-74CC-DD47-AE10-98BDED4E05C7}"/>
+              </a:ext>
+            </a:extLst>
+          </p:cNvPr>
+          <p:cNvSpPr>
+            <a:spLocks noGrp="1"/>
+          </p:cNvSpPr>
+          <p:nvPr>
+            <p:ph type="title"/>
+          </p:nvPr>
+        </p:nvSpPr>
+        <p:spPr/>
+        <p:txBody>
+          <a:bodyPr/>
+          <a:lstStyle/>
+          <a:p>
+            <a:endParaRPr lang="en-US" dirty="0"/>
+          </a:p>
+        </p:txBody>
+      </p:sp>
+      <p:sp>
+        <p:nvSpPr>
+          <p:cNvPr id="5" name="Text Placeholder 4">
+            <a:extLst>
+              <a:ext uri="{FF2B5EF4-FFF2-40B4-BE49-F238E27FC236}">
+                <a16:creationId xmlns:a16="http://schemas.microsoft.com/office/drawing/2014/main" id="{F5A29A0F-5A1D-824A-BC7E-B8FEE0694E67}"/>
+              </a:ext>
+            </a:extLst>
+          </p:cNvPr>
+          <p:cNvSpPr>
+            <a:spLocks noGrp="1"/>
+          </p:cNvSpPr>
+          <p:nvPr>
+            <p:ph type="body" idx="1"/>
+          </p:nvPr>
+        </p:nvSpPr>
+        <p:spPr/>
+        <p:txBody>
+          <a:bodyPr/>
+          <a:lstStyle/>
+          <a:p>
+            <a:r>
+              <a:rPr lang="en-US" dirty="0"/>
+              <a:t>Implementation Guide setup</a:t>
+            </a:r>
+          </a:p>
+        </p:txBody>
+      </p:sp>
+    </p:spTree>
+    <p:extLst>
+      <p:ext uri="{BB962C8B-B14F-4D97-AF65-F5344CB8AC3E}">
+        <p14:creationId xmlns:p14="http://schemas.microsoft.com/office/powerpoint/2010/main" val="3292382004"/>
+      </p:ext>
+    </p:extLst>
+  </p:cSld>
+  <p:clrMapOvr>
+    <a:masterClrMapping/>
+  </p:clrMapOvr>
+</p:sld>
+</file>
+
+<file path=ppt/slides/slide9.xml><?xml version="1.0" encoding="utf-8"?>
+<p:sld xmlns:a="http://schemas.openxmlformats.org/drawingml/2006/main" xmlns:r="http://schemas.openxmlformats.org/officeDocument/2006/relationships" xmlns:p="http://schemas.openxmlformats.org/presentationml/2006/main">
+  <p:cSld>
+    <p:spTree>
+      <p:nvGrpSpPr>
+        <p:cNvPr id="1" name=""/>
+        <p:cNvGrpSpPr/>
+        <p:nvPr/>
+      </p:nvGrpSpPr>
+      <p:grpSpPr>
+        <a:xfrm>
+          <a:off x="0" y="0"/>
+          <a:ext cx="0" cy="0"/>
+          <a:chOff x="0" y="0"/>
+          <a:chExt cx="0" cy="0"/>
+        </a:xfrm>
+      </p:grpSpPr>
       <p:pic>
         <p:nvPicPr>
           <p:cNvPr id="5" name="Picture 4">
@@ -8018,12 +9487,18 @@
         </p:spPr>
         <p:txBody>
           <a:bodyPr>
-            <a:normAutofit fontScale="92500" lnSpcReduction="20000"/>
+            <a:normAutofit fontScale="70000" lnSpcReduction="20000"/>
           </a:bodyPr>
           <a:lstStyle/>
           <a:p>
             <a:r>
               <a:rPr lang="en-US" dirty="0"/>
+              <a:t>Main IG attributes</a:t>
+            </a:r>
+          </a:p>
+          <a:p>
+            <a:r>
+              <a:rPr lang="en-US" dirty="0"/>
               <a:t>Tracks are those with a link to the IG</a:t>
             </a:r>
           </a:p>
@@ -8037,7 +9512,7 @@
           <a:p>
             <a:r>
               <a:rPr lang="en-US" dirty="0"/>
-              <a:t>External link is IG on web (i.e. readable version)</a:t>
+              <a:t>External link is IG on web (i.e. human readable version)</a:t>
             </a:r>
           </a:p>
           <a:p>
@@ -8153,146 +9628,6 @@
     <p:extLst>
       <p:ext uri="{BB962C8B-B14F-4D97-AF65-F5344CB8AC3E}">
         <p14:creationId xmlns:p14="http://schemas.microsoft.com/office/powerpoint/2010/main" val="3686102885"/>
-      </p:ext>
-    </p:extLst>
-  </p:cSld>
-  <p:clrMapOvr>
-    <a:masterClrMapping/>
-  </p:clrMapOvr>
-</p:sld>
-</file>
-
-<file path=ppt/slides/slide9.xml><?xml version="1.0" encoding="utf-8"?>
-<p:sld xmlns:a="http://schemas.openxmlformats.org/drawingml/2006/main" xmlns:r="http://schemas.openxmlformats.org/officeDocument/2006/relationships" xmlns:p="http://schemas.openxmlformats.org/presentationml/2006/main">
-  <p:cSld>
-    <p:spTree>
-      <p:nvGrpSpPr>
-        <p:cNvPr id="1" name=""/>
-        <p:cNvGrpSpPr/>
-        <p:nvPr/>
-      </p:nvGrpSpPr>
-      <p:grpSpPr>
-        <a:xfrm>
-          <a:off x="0" y="0"/>
-          <a:ext cx="0" cy="0"/>
-          <a:chOff x="0" y="0"/>
-          <a:chExt cx="0" cy="0"/>
-        </a:xfrm>
-      </p:grpSpPr>
-      <p:sp>
-        <p:nvSpPr>
-          <p:cNvPr id="2" name="Title 1">
-            <a:extLst>
-              <a:ext uri="{FF2B5EF4-FFF2-40B4-BE49-F238E27FC236}">
-                <a16:creationId xmlns:a16="http://schemas.microsoft.com/office/drawing/2014/main" id="{8BED8509-9152-4B41-ACE2-548263BA84A6}"/>
-              </a:ext>
-            </a:extLst>
-          </p:cNvPr>
-          <p:cNvSpPr>
-            <a:spLocks noGrp="1"/>
-          </p:cNvSpPr>
-          <p:nvPr>
-            <p:ph type="title"/>
-          </p:nvPr>
-        </p:nvSpPr>
-        <p:spPr/>
-        <p:txBody>
-          <a:bodyPr/>
-          <a:lstStyle/>
-          <a:p>
-            <a:r>
-              <a:rPr lang="en-US" dirty="0"/>
-              <a:t>1b Create / Edit IG entry</a:t>
-            </a:r>
-          </a:p>
-        </p:txBody>
-      </p:sp>
-      <p:sp>
-        <p:nvSpPr>
-          <p:cNvPr id="3" name="Content Placeholder 2">
-            <a:extLst>
-              <a:ext uri="{FF2B5EF4-FFF2-40B4-BE49-F238E27FC236}">
-                <a16:creationId xmlns:a16="http://schemas.microsoft.com/office/drawing/2014/main" id="{3F95FCB2-34A4-064B-94BE-72A5C07C03B3}"/>
-              </a:ext>
-            </a:extLst>
-          </p:cNvPr>
-          <p:cNvSpPr>
-            <a:spLocks noGrp="1"/>
-          </p:cNvSpPr>
-          <p:nvPr>
-            <p:ph idx="1"/>
-          </p:nvPr>
-        </p:nvSpPr>
-        <p:spPr>
-          <a:xfrm>
-            <a:off x="6759146" y="1690688"/>
-            <a:ext cx="4436075" cy="4351338"/>
-          </a:xfrm>
-        </p:spPr>
-        <p:txBody>
-          <a:bodyPr/>
-          <a:lstStyle/>
-          <a:p>
-            <a:r>
-              <a:rPr lang="en-US" dirty="0"/>
-              <a:t>Keep name &amp; description short</a:t>
-            </a:r>
-          </a:p>
-          <a:p>
-            <a:r>
-              <a:rPr lang="en-US" dirty="0"/>
-              <a:t>Use ‘External Link’ for location of IG</a:t>
-            </a:r>
-          </a:p>
-          <a:p>
-            <a:r>
-              <a:rPr lang="en-US" dirty="0"/>
-              <a:t>Set package and version so can be found in registry</a:t>
-            </a:r>
-          </a:p>
-          <a:p>
-            <a:pPr lvl="1"/>
-            <a:r>
-              <a:rPr lang="en-US" dirty="0"/>
-              <a:t>Link to registry bottom right for convenience</a:t>
-            </a:r>
-          </a:p>
-        </p:txBody>
-      </p:sp>
-      <p:pic>
-        <p:nvPicPr>
-          <p:cNvPr id="5" name="Picture 4">
-            <a:extLst>
-              <a:ext uri="{FF2B5EF4-FFF2-40B4-BE49-F238E27FC236}">
-                <a16:creationId xmlns:a16="http://schemas.microsoft.com/office/drawing/2014/main" id="{D8819251-3602-E54B-ADA7-7594D62CB7FD}"/>
-              </a:ext>
-            </a:extLst>
-          </p:cNvPr>
-          <p:cNvPicPr>
-            <a:picLocks noChangeAspect="1"/>
-          </p:cNvPicPr>
-          <p:nvPr/>
-        </p:nvPicPr>
-        <p:blipFill>
-          <a:blip r:embed="rId2"/>
-          <a:stretch>
-            <a:fillRect/>
-          </a:stretch>
-        </p:blipFill>
-        <p:spPr>
-          <a:xfrm>
-            <a:off x="838200" y="1406483"/>
-            <a:ext cx="5709737" cy="5167312"/>
-          </a:xfrm>
-          <a:prstGeom prst="rect">
-            <a:avLst/>
-          </a:prstGeom>
-        </p:spPr>
-      </p:pic>
-    </p:spTree>
-    <p:extLst>
-      <p:ext uri="{BB962C8B-B14F-4D97-AF65-F5344CB8AC3E}">
-        <p14:creationId xmlns:p14="http://schemas.microsoft.com/office/powerpoint/2010/main" val="4132065027"/>
       </p:ext>
     </p:extLst>
   </p:cSld>

</xml_diff>